<commit_message>
documentation for 101c2 - GfxObject refactored for multi-key binds
</commit_message>
<xml_diff>
--- a/tech_with_tim/Pygame-Tuts-101-1ABC/Docs/Pygame-101-Tuts-by-MrH.pptx
+++ b/tech_with_tim/Pygame-Tuts-101-1ABC/Docs/Pygame-101-Tuts-by-MrH.pptx
@@ -5,7 +5,7 @@
     <p:sldMasterId id="2147483659" r:id="rId1"/>
   </p:sldMasterIdLst>
   <p:notesMasterIdLst>
-    <p:notesMasterId r:id="rId27"/>
+    <p:notesMasterId r:id="rId38"/>
   </p:notesMasterIdLst>
   <p:sldIdLst>
     <p:sldId id="256" r:id="rId2"/>
@@ -33,6 +33,17 @@
     <p:sldId id="278" r:id="rId24"/>
     <p:sldId id="279" r:id="rId25"/>
     <p:sldId id="280" r:id="rId26"/>
+    <p:sldId id="281" r:id="rId27"/>
+    <p:sldId id="282" r:id="rId28"/>
+    <p:sldId id="283" r:id="rId29"/>
+    <p:sldId id="284" r:id="rId30"/>
+    <p:sldId id="285" r:id="rId31"/>
+    <p:sldId id="286" r:id="rId32"/>
+    <p:sldId id="287" r:id="rId33"/>
+    <p:sldId id="288" r:id="rId34"/>
+    <p:sldId id="291" r:id="rId35"/>
+    <p:sldId id="289" r:id="rId36"/>
+    <p:sldId id="290" r:id="rId37"/>
   </p:sldIdLst>
   <p:sldSz cx="9144000" cy="5143500" type="screen16x9"/>
   <p:notesSz cx="6858000" cy="9144000"/>
@@ -13042,6 +13053,1825 @@
 </p:sld>
 </file>
 
+<file path=ppt/slides/slide26.xml><?xml version="1.0" encoding="utf-8"?>
+<p:sld xmlns:a="http://schemas.openxmlformats.org/drawingml/2006/main" xmlns:r="http://schemas.openxmlformats.org/officeDocument/2006/relationships" xmlns:p="http://schemas.openxmlformats.org/presentationml/2006/main">
+  <p:cSld>
+    <p:spTree>
+      <p:nvGrpSpPr>
+        <p:cNvPr id="1" name=""/>
+        <p:cNvGrpSpPr/>
+        <p:nvPr/>
+      </p:nvGrpSpPr>
+      <p:grpSpPr>
+        <a:xfrm>
+          <a:off x="0" y="0"/>
+          <a:ext cx="0" cy="0"/>
+          <a:chOff x="0" y="0"/>
+          <a:chExt cx="0" cy="0"/>
+        </a:xfrm>
+      </p:grpSpPr>
+      <p:sp>
+        <p:nvSpPr>
+          <p:cNvPr id="2" name="Title 1">
+            <a:extLst>
+              <a:ext uri="{FF2B5EF4-FFF2-40B4-BE49-F238E27FC236}">
+                <a16:creationId xmlns:a16="http://schemas.microsoft.com/office/drawing/2014/main" id="{606CCBFD-0939-32CA-0D31-BF3EA69E46CF}"/>
+              </a:ext>
+            </a:extLst>
+          </p:cNvPr>
+          <p:cNvSpPr>
+            <a:spLocks noGrp="1"/>
+          </p:cNvSpPr>
+          <p:nvPr>
+            <p:ph type="title"/>
+          </p:nvPr>
+        </p:nvSpPr>
+        <p:spPr>
+          <a:xfrm>
+            <a:off x="311700" y="55060"/>
+            <a:ext cx="8520600" cy="572700"/>
+          </a:xfrm>
+        </p:spPr>
+        <p:txBody>
+          <a:bodyPr>
+            <a:normAutofit fontScale="90000"/>
+          </a:bodyPr>
+          <a:lstStyle/>
+          <a:p>
+            <a:r>
+              <a:rPr lang="en-GB" dirty="0"/>
+              <a:t>OOp101-1C2 … Saved as pygame101-oop-tut01c2.py</a:t>
+            </a:r>
+          </a:p>
+        </p:txBody>
+      </p:sp>
+      <p:sp>
+        <p:nvSpPr>
+          <p:cNvPr id="3" name="Text Placeholder 2">
+            <a:extLst>
+              <a:ext uri="{FF2B5EF4-FFF2-40B4-BE49-F238E27FC236}">
+                <a16:creationId xmlns:a16="http://schemas.microsoft.com/office/drawing/2014/main" id="{E7D77B09-785B-C4F3-70EE-DE95632E9006}"/>
+              </a:ext>
+            </a:extLst>
+          </p:cNvPr>
+          <p:cNvSpPr>
+            <a:spLocks noGrp="1"/>
+          </p:cNvSpPr>
+          <p:nvPr>
+            <p:ph type="body" idx="1"/>
+          </p:nvPr>
+        </p:nvSpPr>
+        <p:spPr>
+          <a:xfrm>
+            <a:off x="311700" y="627760"/>
+            <a:ext cx="8520600" cy="3416400"/>
+          </a:xfrm>
+        </p:spPr>
+        <p:txBody>
+          <a:bodyPr>
+            <a:normAutofit/>
+          </a:bodyPr>
+          <a:lstStyle/>
+          <a:p>
+            <a:pPr marL="114300" indent="0">
+              <a:buNone/>
+            </a:pPr>
+            <a:r>
+              <a:rPr lang="en-GB" dirty="0" err="1"/>
+              <a:t>gfxObject</a:t>
+            </a:r>
+            <a:r>
+              <a:rPr lang="en-GB" dirty="0"/>
+              <a:t> alterations:</a:t>
+            </a:r>
+          </a:p>
+          <a:p>
+            <a:r>
+              <a:rPr lang="en-GB" dirty="0"/>
+              <a:t>Added getters and setters for position.</a:t>
+            </a:r>
+          </a:p>
+          <a:p>
+            <a:endParaRPr lang="en-GB" dirty="0"/>
+          </a:p>
+          <a:p>
+            <a:r>
+              <a:rPr lang="en-GB" dirty="0"/>
+              <a:t>Changed </a:t>
+            </a:r>
+            <a:r>
+              <a:rPr lang="en-GB" dirty="0" err="1"/>
+              <a:t>key_binds</a:t>
+            </a:r>
+            <a:r>
+              <a:rPr lang="en-GB" dirty="0"/>
+              <a:t> dictionary to be of the format {</a:t>
+            </a:r>
+            <a:r>
+              <a:rPr lang="en-GB" dirty="0" err="1"/>
+              <a:t>keyString</a:t>
+            </a:r>
+            <a:r>
+              <a:rPr lang="en-GB" dirty="0"/>
+              <a:t> : [</a:t>
+            </a:r>
+            <a:r>
+              <a:rPr lang="en-GB" dirty="0" err="1"/>
+              <a:t>pygameKeys</a:t>
+            </a:r>
+            <a:r>
+              <a:rPr lang="en-GB" dirty="0"/>
+              <a:t>]}</a:t>
+            </a:r>
+          </a:p>
+          <a:p>
+            <a:pPr marL="114300" indent="0">
+              <a:buNone/>
+            </a:pPr>
+            <a:r>
+              <a:rPr lang="en-GB" dirty="0"/>
+              <a:t>	i.e. a list of keys so multiple keys </a:t>
+            </a:r>
+          </a:p>
+          <a:p>
+            <a:r>
+              <a:rPr lang="en-GB" dirty="0"/>
+              <a:t>Helper methods to manage this:</a:t>
+            </a:r>
+          </a:p>
+          <a:p>
+            <a:pPr lvl="1"/>
+            <a:r>
+              <a:rPr lang="en-GB" dirty="0" err="1"/>
+              <a:t>getKeyIdStrings</a:t>
+            </a:r>
+            <a:r>
+              <a:rPr lang="en-GB" dirty="0"/>
+              <a:t>() : list of key strings to bind to : </a:t>
+            </a:r>
+            <a:r>
+              <a:rPr lang="en-GB" dirty="0">
+                <a:solidFill>
+                  <a:srgbClr val="C2E890"/>
+                </a:solidFill>
+                <a:effectLst/>
+                <a:highlight>
+                  <a:srgbClr val="282828"/>
+                </a:highlight>
+                <a:latin typeface="Consolas" panose="020B0609020204030204" pitchFamily="49" charset="0"/>
+              </a:rPr>
+              <a:t>[</a:t>
+            </a:r>
+            <a:r>
+              <a:rPr lang="en-GB" dirty="0">
+                <a:solidFill>
+                  <a:srgbClr val="E1B42B"/>
+                </a:solidFill>
+                <a:effectLst/>
+                <a:highlight>
+                  <a:srgbClr val="282828"/>
+                </a:highlight>
+                <a:latin typeface="Consolas" panose="020B0609020204030204" pitchFamily="49" charset="0"/>
+              </a:rPr>
+              <a:t>"left"</a:t>
+            </a:r>
+            <a:r>
+              <a:rPr lang="en-GB" dirty="0">
+                <a:solidFill>
+                  <a:srgbClr val="C2E890"/>
+                </a:solidFill>
+                <a:effectLst/>
+                <a:highlight>
+                  <a:srgbClr val="282828"/>
+                </a:highlight>
+                <a:latin typeface="Consolas" panose="020B0609020204030204" pitchFamily="49" charset="0"/>
+              </a:rPr>
+              <a:t>,</a:t>
+            </a:r>
+            <a:r>
+              <a:rPr lang="en-GB" dirty="0">
+                <a:solidFill>
+                  <a:srgbClr val="C0C0C0"/>
+                </a:solidFill>
+                <a:effectLst/>
+                <a:highlight>
+                  <a:srgbClr val="282828"/>
+                </a:highlight>
+                <a:latin typeface="Consolas" panose="020B0609020204030204" pitchFamily="49" charset="0"/>
+              </a:rPr>
+              <a:t> </a:t>
+            </a:r>
+            <a:r>
+              <a:rPr lang="en-GB" dirty="0">
+                <a:solidFill>
+                  <a:srgbClr val="E1B42B"/>
+                </a:solidFill>
+                <a:effectLst/>
+                <a:highlight>
+                  <a:srgbClr val="282828"/>
+                </a:highlight>
+                <a:latin typeface="Consolas" panose="020B0609020204030204" pitchFamily="49" charset="0"/>
+              </a:rPr>
+              <a:t>"right"</a:t>
+            </a:r>
+            <a:r>
+              <a:rPr lang="en-GB" dirty="0">
+                <a:solidFill>
+                  <a:srgbClr val="C2E890"/>
+                </a:solidFill>
+                <a:effectLst/>
+                <a:highlight>
+                  <a:srgbClr val="282828"/>
+                </a:highlight>
+                <a:latin typeface="Consolas" panose="020B0609020204030204" pitchFamily="49" charset="0"/>
+              </a:rPr>
+              <a:t>,</a:t>
+            </a:r>
+            <a:r>
+              <a:rPr lang="en-GB" dirty="0">
+                <a:solidFill>
+                  <a:srgbClr val="C0C0C0"/>
+                </a:solidFill>
+                <a:effectLst/>
+                <a:highlight>
+                  <a:srgbClr val="282828"/>
+                </a:highlight>
+                <a:latin typeface="Consolas" panose="020B0609020204030204" pitchFamily="49" charset="0"/>
+              </a:rPr>
+              <a:t> </a:t>
+            </a:r>
+            <a:r>
+              <a:rPr lang="en-GB" dirty="0">
+                <a:solidFill>
+                  <a:srgbClr val="E1B42B"/>
+                </a:solidFill>
+                <a:effectLst/>
+                <a:highlight>
+                  <a:srgbClr val="282828"/>
+                </a:highlight>
+                <a:latin typeface="Consolas" panose="020B0609020204030204" pitchFamily="49" charset="0"/>
+              </a:rPr>
+              <a:t>"up"</a:t>
+            </a:r>
+            <a:r>
+              <a:rPr lang="en-GB" dirty="0">
+                <a:solidFill>
+                  <a:srgbClr val="C2E890"/>
+                </a:solidFill>
+                <a:effectLst/>
+                <a:highlight>
+                  <a:srgbClr val="282828"/>
+                </a:highlight>
+                <a:latin typeface="Consolas" panose="020B0609020204030204" pitchFamily="49" charset="0"/>
+              </a:rPr>
+              <a:t>,</a:t>
+            </a:r>
+            <a:r>
+              <a:rPr lang="en-GB" dirty="0">
+                <a:solidFill>
+                  <a:srgbClr val="C0C0C0"/>
+                </a:solidFill>
+                <a:effectLst/>
+                <a:highlight>
+                  <a:srgbClr val="282828"/>
+                </a:highlight>
+                <a:latin typeface="Consolas" panose="020B0609020204030204" pitchFamily="49" charset="0"/>
+              </a:rPr>
+              <a:t> </a:t>
+            </a:r>
+            <a:r>
+              <a:rPr lang="en-GB" dirty="0">
+                <a:solidFill>
+                  <a:srgbClr val="E1B42B"/>
+                </a:solidFill>
+                <a:effectLst/>
+                <a:highlight>
+                  <a:srgbClr val="282828"/>
+                </a:highlight>
+                <a:latin typeface="Consolas" panose="020B0609020204030204" pitchFamily="49" charset="0"/>
+              </a:rPr>
+              <a:t>"down"</a:t>
+            </a:r>
+            <a:r>
+              <a:rPr lang="en-GB" dirty="0">
+                <a:solidFill>
+                  <a:srgbClr val="C2E890"/>
+                </a:solidFill>
+                <a:effectLst/>
+                <a:highlight>
+                  <a:srgbClr val="282828"/>
+                </a:highlight>
+                <a:latin typeface="Consolas" panose="020B0609020204030204" pitchFamily="49" charset="0"/>
+              </a:rPr>
+              <a:t>,</a:t>
+            </a:r>
+            <a:r>
+              <a:rPr lang="en-GB" dirty="0">
+                <a:solidFill>
+                  <a:srgbClr val="C0C0C0"/>
+                </a:solidFill>
+                <a:effectLst/>
+                <a:highlight>
+                  <a:srgbClr val="282828"/>
+                </a:highlight>
+                <a:latin typeface="Consolas" panose="020B0609020204030204" pitchFamily="49" charset="0"/>
+              </a:rPr>
+              <a:t> </a:t>
+            </a:r>
+            <a:r>
+              <a:rPr lang="en-GB" dirty="0">
+                <a:solidFill>
+                  <a:srgbClr val="E1B42B"/>
+                </a:solidFill>
+                <a:effectLst/>
+                <a:highlight>
+                  <a:srgbClr val="282828"/>
+                </a:highlight>
+                <a:latin typeface="Consolas" panose="020B0609020204030204" pitchFamily="49" charset="0"/>
+              </a:rPr>
+              <a:t>"jump"</a:t>
+            </a:r>
+            <a:r>
+              <a:rPr lang="en-GB" dirty="0">
+                <a:solidFill>
+                  <a:srgbClr val="C2E890"/>
+                </a:solidFill>
+                <a:effectLst/>
+                <a:highlight>
+                  <a:srgbClr val="282828"/>
+                </a:highlight>
+                <a:latin typeface="Consolas" panose="020B0609020204030204" pitchFamily="49" charset="0"/>
+              </a:rPr>
+              <a:t>,</a:t>
+            </a:r>
+            <a:r>
+              <a:rPr lang="en-GB" dirty="0">
+                <a:solidFill>
+                  <a:srgbClr val="C0C0C0"/>
+                </a:solidFill>
+                <a:effectLst/>
+                <a:highlight>
+                  <a:srgbClr val="282828"/>
+                </a:highlight>
+                <a:latin typeface="Consolas" panose="020B0609020204030204" pitchFamily="49" charset="0"/>
+              </a:rPr>
+              <a:t> </a:t>
+            </a:r>
+            <a:r>
+              <a:rPr lang="en-GB" dirty="0">
+                <a:solidFill>
+                  <a:srgbClr val="E1B42B"/>
+                </a:solidFill>
+                <a:effectLst/>
+                <a:highlight>
+                  <a:srgbClr val="282828"/>
+                </a:highlight>
+                <a:latin typeface="Consolas" panose="020B0609020204030204" pitchFamily="49" charset="0"/>
+              </a:rPr>
+              <a:t>"fire"</a:t>
+            </a:r>
+            <a:r>
+              <a:rPr lang="en-GB" dirty="0">
+                <a:solidFill>
+                  <a:srgbClr val="C2E890"/>
+                </a:solidFill>
+                <a:effectLst/>
+                <a:highlight>
+                  <a:srgbClr val="282828"/>
+                </a:highlight>
+                <a:latin typeface="Consolas" panose="020B0609020204030204" pitchFamily="49" charset="0"/>
+              </a:rPr>
+              <a:t>,</a:t>
+            </a:r>
+            <a:r>
+              <a:rPr lang="en-GB" dirty="0">
+                <a:solidFill>
+                  <a:srgbClr val="C0C0C0"/>
+                </a:solidFill>
+                <a:effectLst/>
+                <a:highlight>
+                  <a:srgbClr val="282828"/>
+                </a:highlight>
+                <a:latin typeface="Consolas" panose="020B0609020204030204" pitchFamily="49" charset="0"/>
+              </a:rPr>
+              <a:t> </a:t>
+            </a:r>
+            <a:r>
+              <a:rPr lang="en-GB" dirty="0">
+                <a:solidFill>
+                  <a:srgbClr val="E1B42B"/>
+                </a:solidFill>
+                <a:effectLst/>
+                <a:highlight>
+                  <a:srgbClr val="282828"/>
+                </a:highlight>
+                <a:latin typeface="Consolas" panose="020B0609020204030204" pitchFamily="49" charset="0"/>
+              </a:rPr>
+              <a:t>"fire2"</a:t>
+            </a:r>
+            <a:r>
+              <a:rPr lang="en-GB" dirty="0">
+                <a:solidFill>
+                  <a:srgbClr val="C2E890"/>
+                </a:solidFill>
+                <a:effectLst/>
+                <a:highlight>
+                  <a:srgbClr val="282828"/>
+                </a:highlight>
+                <a:latin typeface="Consolas" panose="020B0609020204030204" pitchFamily="49" charset="0"/>
+              </a:rPr>
+              <a:t>,</a:t>
+            </a:r>
+            <a:r>
+              <a:rPr lang="en-GB" dirty="0">
+                <a:solidFill>
+                  <a:srgbClr val="C0C0C0"/>
+                </a:solidFill>
+                <a:effectLst/>
+                <a:highlight>
+                  <a:srgbClr val="282828"/>
+                </a:highlight>
+                <a:latin typeface="Consolas" panose="020B0609020204030204" pitchFamily="49" charset="0"/>
+              </a:rPr>
+              <a:t> </a:t>
+            </a:r>
+            <a:r>
+              <a:rPr lang="en-GB" dirty="0">
+                <a:solidFill>
+                  <a:srgbClr val="E1B42B"/>
+                </a:solidFill>
+                <a:effectLst/>
+                <a:highlight>
+                  <a:srgbClr val="282828"/>
+                </a:highlight>
+                <a:latin typeface="Consolas" panose="020B0609020204030204" pitchFamily="49" charset="0"/>
+              </a:rPr>
+              <a:t>"use"</a:t>
+            </a:r>
+            <a:r>
+              <a:rPr lang="en-GB" dirty="0">
+                <a:solidFill>
+                  <a:srgbClr val="C2E890"/>
+                </a:solidFill>
+                <a:effectLst/>
+                <a:highlight>
+                  <a:srgbClr val="282828"/>
+                </a:highlight>
+                <a:latin typeface="Consolas" panose="020B0609020204030204" pitchFamily="49" charset="0"/>
+              </a:rPr>
+              <a:t>,</a:t>
+            </a:r>
+            <a:r>
+              <a:rPr lang="en-GB" dirty="0">
+                <a:solidFill>
+                  <a:srgbClr val="C0C0C0"/>
+                </a:solidFill>
+                <a:effectLst/>
+                <a:highlight>
+                  <a:srgbClr val="282828"/>
+                </a:highlight>
+                <a:latin typeface="Consolas" panose="020B0609020204030204" pitchFamily="49" charset="0"/>
+              </a:rPr>
+              <a:t> </a:t>
+            </a:r>
+            <a:r>
+              <a:rPr lang="en-GB" dirty="0">
+                <a:solidFill>
+                  <a:srgbClr val="E1B42B"/>
+                </a:solidFill>
+                <a:effectLst/>
+                <a:highlight>
+                  <a:srgbClr val="282828"/>
+                </a:highlight>
+                <a:latin typeface="Consolas" panose="020B0609020204030204" pitchFamily="49" charset="0"/>
+              </a:rPr>
+              <a:t>"duck"</a:t>
+            </a:r>
+            <a:r>
+              <a:rPr lang="en-GB" dirty="0">
+                <a:solidFill>
+                  <a:srgbClr val="C2E890"/>
+                </a:solidFill>
+                <a:effectLst/>
+                <a:highlight>
+                  <a:srgbClr val="282828"/>
+                </a:highlight>
+                <a:latin typeface="Consolas" panose="020B0609020204030204" pitchFamily="49" charset="0"/>
+              </a:rPr>
+              <a:t>]</a:t>
+            </a:r>
+          </a:p>
+          <a:p>
+            <a:pPr lvl="1"/>
+            <a:r>
+              <a:rPr lang="en-GB" dirty="0" err="1">
+                <a:solidFill>
+                  <a:schemeClr val="tx1"/>
+                </a:solidFill>
+              </a:rPr>
+              <a:t>wasPressed</a:t>
+            </a:r>
+            <a:r>
+              <a:rPr lang="en-GB" dirty="0">
+                <a:solidFill>
+                  <a:schemeClr val="tx1"/>
+                </a:solidFill>
+              </a:rPr>
+              <a:t>(</a:t>
+            </a:r>
+            <a:r>
+              <a:rPr lang="en-GB" dirty="0" err="1">
+                <a:solidFill>
+                  <a:schemeClr val="tx1"/>
+                </a:solidFill>
+              </a:rPr>
+              <a:t>keyIdString</a:t>
+            </a:r>
+            <a:r>
+              <a:rPr lang="en-GB" dirty="0">
+                <a:solidFill>
+                  <a:schemeClr val="tx1"/>
+                </a:solidFill>
+              </a:rPr>
+              <a:t>, </a:t>
+            </a:r>
+            <a:r>
+              <a:rPr lang="en-GB" dirty="0" err="1">
+                <a:solidFill>
+                  <a:schemeClr val="tx1"/>
+                </a:solidFill>
+              </a:rPr>
+              <a:t>keys:pygame.key</a:t>
+            </a:r>
+            <a:r>
+              <a:rPr lang="en-GB" dirty="0">
+                <a:solidFill>
+                  <a:schemeClr val="tx1"/>
+                </a:solidFill>
+              </a:rPr>
+              <a:t>) -&gt; bool :</a:t>
+            </a:r>
+          </a:p>
+          <a:p>
+            <a:pPr marL="596900" lvl="1" indent="0">
+              <a:buNone/>
+            </a:pPr>
+            <a:r>
+              <a:rPr lang="en-GB" dirty="0"/>
+              <a:t>	returns True if a </a:t>
+            </a:r>
+            <a:r>
+              <a:rPr lang="en-GB" dirty="0" err="1"/>
+              <a:t>keyBindString</a:t>
+            </a:r>
+            <a:r>
+              <a:rPr lang="en-GB" dirty="0"/>
+              <a:t> and matching </a:t>
+            </a:r>
+            <a:r>
+              <a:rPr lang="en-GB" dirty="0" err="1"/>
+              <a:t>pygame</a:t>
+            </a:r>
+            <a:r>
+              <a:rPr lang="en-GB" dirty="0"/>
+              <a:t> key was prepressed</a:t>
+            </a:r>
+            <a:br>
+              <a:rPr lang="en-GB" sz="1800" dirty="0">
+                <a:effectLst/>
+                <a:highlight>
+                  <a:srgbClr val="282828"/>
+                </a:highlight>
+                <a:latin typeface="Consolas" panose="020B0609020204030204" pitchFamily="49" charset="0"/>
+              </a:rPr>
+            </a:br>
+            <a:endParaRPr lang="en-GB" sz="1800" dirty="0">
+              <a:effectLst/>
+              <a:highlight>
+                <a:srgbClr val="282828"/>
+              </a:highlight>
+              <a:latin typeface="Consolas" panose="020B0609020204030204" pitchFamily="49" charset="0"/>
+            </a:endParaRPr>
+          </a:p>
+          <a:p>
+            <a:pPr lvl="1"/>
+            <a:endParaRPr lang="en-GB" dirty="0"/>
+          </a:p>
+        </p:txBody>
+      </p:sp>
+    </p:spTree>
+    <p:extLst>
+      <p:ext uri="{BB962C8B-B14F-4D97-AF65-F5344CB8AC3E}">
+        <p14:creationId xmlns:p14="http://schemas.microsoft.com/office/powerpoint/2010/main" val="4223829216"/>
+      </p:ext>
+    </p:extLst>
+  </p:cSld>
+  <p:clrMapOvr>
+    <a:masterClrMapping/>
+  </p:clrMapOvr>
+</p:sld>
+</file>
+
+<file path=ppt/slides/slide27.xml><?xml version="1.0" encoding="utf-8"?>
+<p:sld xmlns:a="http://schemas.openxmlformats.org/drawingml/2006/main" xmlns:r="http://schemas.openxmlformats.org/officeDocument/2006/relationships" xmlns:p="http://schemas.openxmlformats.org/presentationml/2006/main">
+  <p:cSld>
+    <p:spTree>
+      <p:nvGrpSpPr>
+        <p:cNvPr id="1" name=""/>
+        <p:cNvGrpSpPr/>
+        <p:nvPr/>
+      </p:nvGrpSpPr>
+      <p:grpSpPr>
+        <a:xfrm>
+          <a:off x="0" y="0"/>
+          <a:ext cx="0" cy="0"/>
+          <a:chOff x="0" y="0"/>
+          <a:chExt cx="0" cy="0"/>
+        </a:xfrm>
+      </p:grpSpPr>
+      <p:sp>
+        <p:nvSpPr>
+          <p:cNvPr id="2" name="Title 1">
+            <a:extLst>
+              <a:ext uri="{FF2B5EF4-FFF2-40B4-BE49-F238E27FC236}">
+                <a16:creationId xmlns:a16="http://schemas.microsoft.com/office/drawing/2014/main" id="{EA29DC3D-D5C8-1B8F-75C0-227D6D53B8EB}"/>
+              </a:ext>
+            </a:extLst>
+          </p:cNvPr>
+          <p:cNvSpPr>
+            <a:spLocks noGrp="1"/>
+          </p:cNvSpPr>
+          <p:nvPr>
+            <p:ph type="title"/>
+          </p:nvPr>
+        </p:nvSpPr>
+        <p:spPr>
+          <a:xfrm>
+            <a:off x="311700" y="95401"/>
+            <a:ext cx="8520600" cy="572700"/>
+          </a:xfrm>
+        </p:spPr>
+        <p:txBody>
+          <a:bodyPr>
+            <a:normAutofit fontScale="90000"/>
+          </a:bodyPr>
+          <a:lstStyle/>
+          <a:p>
+            <a:r>
+              <a:rPr lang="en-GB" dirty="0"/>
+              <a:t>Class </a:t>
+            </a:r>
+            <a:r>
+              <a:rPr lang="en-GB" dirty="0" err="1"/>
+              <a:t>GfxObject</a:t>
+            </a:r>
+            <a:r>
+              <a:rPr lang="en-GB" dirty="0"/>
+              <a:t> UML updated</a:t>
+            </a:r>
+          </a:p>
+        </p:txBody>
+      </p:sp>
+      <p:pic>
+        <p:nvPicPr>
+          <p:cNvPr id="5" name="Picture 4">
+            <a:extLst>
+              <a:ext uri="{FF2B5EF4-FFF2-40B4-BE49-F238E27FC236}">
+                <a16:creationId xmlns:a16="http://schemas.microsoft.com/office/drawing/2014/main" id="{89534AF2-8752-B0E7-3709-D783E891CBC2}"/>
+              </a:ext>
+            </a:extLst>
+          </p:cNvPr>
+          <p:cNvPicPr>
+            <a:picLocks noChangeAspect="1"/>
+          </p:cNvPicPr>
+          <p:nvPr/>
+        </p:nvPicPr>
+        <p:blipFill>
+          <a:blip r:embed="rId2"/>
+          <a:stretch>
+            <a:fillRect/>
+          </a:stretch>
+        </p:blipFill>
+        <p:spPr>
+          <a:xfrm>
+            <a:off x="4961157" y="381751"/>
+            <a:ext cx="4007670" cy="4652682"/>
+          </a:xfrm>
+          <a:prstGeom prst="rect">
+            <a:avLst/>
+          </a:prstGeom>
+        </p:spPr>
+      </p:pic>
+      <p:sp>
+        <p:nvSpPr>
+          <p:cNvPr id="6" name="TextBox 5">
+            <a:extLst>
+              <a:ext uri="{FF2B5EF4-FFF2-40B4-BE49-F238E27FC236}">
+                <a16:creationId xmlns:a16="http://schemas.microsoft.com/office/drawing/2014/main" id="{E95A281C-7567-2E94-546C-4B5DF0C0E78E}"/>
+              </a:ext>
+            </a:extLst>
+          </p:cNvPr>
+          <p:cNvSpPr txBox="1"/>
+          <p:nvPr/>
+        </p:nvSpPr>
+        <p:spPr>
+          <a:xfrm>
+            <a:off x="5022476" y="0"/>
+            <a:ext cx="3946351" cy="307777"/>
+          </a:xfrm>
+          <a:prstGeom prst="rect">
+            <a:avLst/>
+          </a:prstGeom>
+          <a:noFill/>
+        </p:spPr>
+        <p:txBody>
+          <a:bodyPr wrap="square">
+            <a:spAutoFit/>
+          </a:bodyPr>
+          <a:lstStyle/>
+          <a:p>
+            <a:r>
+              <a:rPr lang="en-GB" dirty="0"/>
+              <a:t>See: UML/pygame-101c-uml-class-world(ver3b)</a:t>
+            </a:r>
+          </a:p>
+        </p:txBody>
+      </p:sp>
+      <p:pic>
+        <p:nvPicPr>
+          <p:cNvPr id="10" name="Picture 9">
+            <a:extLst>
+              <a:ext uri="{FF2B5EF4-FFF2-40B4-BE49-F238E27FC236}">
+                <a16:creationId xmlns:a16="http://schemas.microsoft.com/office/drawing/2014/main" id="{CC688E8F-442B-5601-3563-47E7196583E5}"/>
+              </a:ext>
+            </a:extLst>
+          </p:cNvPr>
+          <p:cNvPicPr>
+            <a:picLocks noChangeAspect="1"/>
+          </p:cNvPicPr>
+          <p:nvPr/>
+        </p:nvPicPr>
+        <p:blipFill>
+          <a:blip r:embed="rId3"/>
+          <a:stretch>
+            <a:fillRect/>
+          </a:stretch>
+        </p:blipFill>
+        <p:spPr>
+          <a:xfrm>
+            <a:off x="256615" y="695325"/>
+            <a:ext cx="1638300" cy="1876425"/>
+          </a:xfrm>
+          <a:prstGeom prst="rect">
+            <a:avLst/>
+          </a:prstGeom>
+        </p:spPr>
+      </p:pic>
+      <p:pic>
+        <p:nvPicPr>
+          <p:cNvPr id="12" name="Picture 11">
+            <a:extLst>
+              <a:ext uri="{FF2B5EF4-FFF2-40B4-BE49-F238E27FC236}">
+                <a16:creationId xmlns:a16="http://schemas.microsoft.com/office/drawing/2014/main" id="{8A7B331B-1D74-3462-734B-6DFB7FE8A172}"/>
+              </a:ext>
+            </a:extLst>
+          </p:cNvPr>
+          <p:cNvPicPr>
+            <a:picLocks noChangeAspect="1"/>
+          </p:cNvPicPr>
+          <p:nvPr/>
+        </p:nvPicPr>
+        <p:blipFill>
+          <a:blip r:embed="rId4"/>
+          <a:stretch>
+            <a:fillRect/>
+          </a:stretch>
+        </p:blipFill>
+        <p:spPr>
+          <a:xfrm>
+            <a:off x="2324379" y="668101"/>
+            <a:ext cx="2047875" cy="3181350"/>
+          </a:xfrm>
+          <a:prstGeom prst="rect">
+            <a:avLst/>
+          </a:prstGeom>
+        </p:spPr>
+      </p:pic>
+      <p:sp>
+        <p:nvSpPr>
+          <p:cNvPr id="13" name="Arrow: Right 12">
+            <a:extLst>
+              <a:ext uri="{FF2B5EF4-FFF2-40B4-BE49-F238E27FC236}">
+                <a16:creationId xmlns:a16="http://schemas.microsoft.com/office/drawing/2014/main" id="{3D10851E-E210-FA85-2F56-278D5E3D8F54}"/>
+              </a:ext>
+            </a:extLst>
+          </p:cNvPr>
+          <p:cNvSpPr/>
+          <p:nvPr/>
+        </p:nvSpPr>
+        <p:spPr>
+          <a:xfrm>
+            <a:off x="311700" y="1815353"/>
+            <a:ext cx="448059" cy="174812"/>
+          </a:xfrm>
+          <a:prstGeom prst="rightArrow">
+            <a:avLst/>
+          </a:prstGeom>
+        </p:spPr>
+        <p:style>
+          <a:lnRef idx="1">
+            <a:schemeClr val="accent6"/>
+          </a:lnRef>
+          <a:fillRef idx="2">
+            <a:schemeClr val="accent6"/>
+          </a:fillRef>
+          <a:effectRef idx="1">
+            <a:schemeClr val="accent6"/>
+          </a:effectRef>
+          <a:fontRef idx="minor">
+            <a:schemeClr val="dk1"/>
+          </a:fontRef>
+        </p:style>
+        <p:txBody>
+          <a:bodyPr rtlCol="0" anchor="ctr"/>
+          <a:lstStyle/>
+          <a:p>
+            <a:pPr algn="ctr"/>
+            <a:endParaRPr lang="en-GB"/>
+          </a:p>
+        </p:txBody>
+      </p:sp>
+      <p:sp>
+        <p:nvSpPr>
+          <p:cNvPr id="14" name="Arrow: Right 13">
+            <a:extLst>
+              <a:ext uri="{FF2B5EF4-FFF2-40B4-BE49-F238E27FC236}">
+                <a16:creationId xmlns:a16="http://schemas.microsoft.com/office/drawing/2014/main" id="{0AFA1EF1-A4D6-EB73-F47F-80AAD9CA5D16}"/>
+              </a:ext>
+            </a:extLst>
+          </p:cNvPr>
+          <p:cNvSpPr/>
+          <p:nvPr/>
+        </p:nvSpPr>
+        <p:spPr>
+          <a:xfrm>
+            <a:off x="2324379" y="1633537"/>
+            <a:ext cx="448059" cy="174812"/>
+          </a:xfrm>
+          <a:prstGeom prst="rightArrow">
+            <a:avLst/>
+          </a:prstGeom>
+        </p:spPr>
+        <p:style>
+          <a:lnRef idx="1">
+            <a:schemeClr val="accent5"/>
+          </a:lnRef>
+          <a:fillRef idx="2">
+            <a:schemeClr val="accent5"/>
+          </a:fillRef>
+          <a:effectRef idx="1">
+            <a:schemeClr val="accent5"/>
+          </a:effectRef>
+          <a:fontRef idx="minor">
+            <a:schemeClr val="dk1"/>
+          </a:fontRef>
+        </p:style>
+        <p:txBody>
+          <a:bodyPr rtlCol="0" anchor="ctr"/>
+          <a:lstStyle/>
+          <a:p>
+            <a:pPr algn="ctr"/>
+            <a:endParaRPr lang="en-GB"/>
+          </a:p>
+        </p:txBody>
+      </p:sp>
+      <p:sp>
+        <p:nvSpPr>
+          <p:cNvPr id="15" name="Arrow: Right 14">
+            <a:extLst>
+              <a:ext uri="{FF2B5EF4-FFF2-40B4-BE49-F238E27FC236}">
+                <a16:creationId xmlns:a16="http://schemas.microsoft.com/office/drawing/2014/main" id="{2F13EDF3-27A5-CFC8-1501-43F77BFAE4CD}"/>
+              </a:ext>
+            </a:extLst>
+          </p:cNvPr>
+          <p:cNvSpPr/>
+          <p:nvPr/>
+        </p:nvSpPr>
+        <p:spPr>
+          <a:xfrm>
+            <a:off x="2324379" y="1808349"/>
+            <a:ext cx="448059" cy="174812"/>
+          </a:xfrm>
+          <a:prstGeom prst="rightArrow">
+            <a:avLst/>
+          </a:prstGeom>
+        </p:spPr>
+        <p:style>
+          <a:lnRef idx="1">
+            <a:schemeClr val="accent5"/>
+          </a:lnRef>
+          <a:fillRef idx="2">
+            <a:schemeClr val="accent5"/>
+          </a:fillRef>
+          <a:effectRef idx="1">
+            <a:schemeClr val="accent5"/>
+          </a:effectRef>
+          <a:fontRef idx="minor">
+            <a:schemeClr val="dk1"/>
+          </a:fontRef>
+        </p:style>
+        <p:txBody>
+          <a:bodyPr rtlCol="0" anchor="ctr"/>
+          <a:lstStyle/>
+          <a:p>
+            <a:pPr algn="ctr"/>
+            <a:endParaRPr lang="en-GB"/>
+          </a:p>
+        </p:txBody>
+      </p:sp>
+      <p:sp>
+        <p:nvSpPr>
+          <p:cNvPr id="16" name="Arrow: Right 15">
+            <a:extLst>
+              <a:ext uri="{FF2B5EF4-FFF2-40B4-BE49-F238E27FC236}">
+                <a16:creationId xmlns:a16="http://schemas.microsoft.com/office/drawing/2014/main" id="{2E4EDA62-8E91-E69F-42F3-5F9D9E1A3396}"/>
+              </a:ext>
+            </a:extLst>
+          </p:cNvPr>
+          <p:cNvSpPr/>
+          <p:nvPr/>
+        </p:nvSpPr>
+        <p:spPr>
+          <a:xfrm>
+            <a:off x="2324378" y="3072934"/>
+            <a:ext cx="448059" cy="174812"/>
+          </a:xfrm>
+          <a:prstGeom prst="rightArrow">
+            <a:avLst/>
+          </a:prstGeom>
+        </p:spPr>
+        <p:style>
+          <a:lnRef idx="1">
+            <a:schemeClr val="accent5"/>
+          </a:lnRef>
+          <a:fillRef idx="2">
+            <a:schemeClr val="accent5"/>
+          </a:fillRef>
+          <a:effectRef idx="1">
+            <a:schemeClr val="accent5"/>
+          </a:effectRef>
+          <a:fontRef idx="minor">
+            <a:schemeClr val="dk1"/>
+          </a:fontRef>
+        </p:style>
+        <p:txBody>
+          <a:bodyPr rtlCol="0" anchor="ctr"/>
+          <a:lstStyle/>
+          <a:p>
+            <a:pPr algn="ctr"/>
+            <a:endParaRPr lang="en-GB"/>
+          </a:p>
+        </p:txBody>
+      </p:sp>
+      <p:sp>
+        <p:nvSpPr>
+          <p:cNvPr id="17" name="Arrow: Right 16">
+            <a:extLst>
+              <a:ext uri="{FF2B5EF4-FFF2-40B4-BE49-F238E27FC236}">
+                <a16:creationId xmlns:a16="http://schemas.microsoft.com/office/drawing/2014/main" id="{30C1FACA-E1FC-106F-E428-CFCFD68C1FC2}"/>
+              </a:ext>
+            </a:extLst>
+          </p:cNvPr>
+          <p:cNvSpPr/>
+          <p:nvPr/>
+        </p:nvSpPr>
+        <p:spPr>
+          <a:xfrm>
+            <a:off x="2324377" y="3461192"/>
+            <a:ext cx="448059" cy="174812"/>
+          </a:xfrm>
+          <a:prstGeom prst="rightArrow">
+            <a:avLst/>
+          </a:prstGeom>
+        </p:spPr>
+        <p:style>
+          <a:lnRef idx="1">
+            <a:schemeClr val="accent5"/>
+          </a:lnRef>
+          <a:fillRef idx="2">
+            <a:schemeClr val="accent5"/>
+          </a:fillRef>
+          <a:effectRef idx="1">
+            <a:schemeClr val="accent5"/>
+          </a:effectRef>
+          <a:fontRef idx="minor">
+            <a:schemeClr val="dk1"/>
+          </a:fontRef>
+        </p:style>
+        <p:txBody>
+          <a:bodyPr rtlCol="0" anchor="ctr"/>
+          <a:lstStyle/>
+          <a:p>
+            <a:pPr algn="ctr"/>
+            <a:endParaRPr lang="en-GB"/>
+          </a:p>
+        </p:txBody>
+      </p:sp>
+      <p:sp>
+        <p:nvSpPr>
+          <p:cNvPr id="18" name="Arrow: Right 17">
+            <a:extLst>
+              <a:ext uri="{FF2B5EF4-FFF2-40B4-BE49-F238E27FC236}">
+                <a16:creationId xmlns:a16="http://schemas.microsoft.com/office/drawing/2014/main" id="{34CD9A32-F687-C8A4-B461-4D0698442A19}"/>
+              </a:ext>
+            </a:extLst>
+          </p:cNvPr>
+          <p:cNvSpPr/>
+          <p:nvPr/>
+        </p:nvSpPr>
+        <p:spPr>
+          <a:xfrm>
+            <a:off x="2324376" y="1084969"/>
+            <a:ext cx="448059" cy="174812"/>
+          </a:xfrm>
+          <a:prstGeom prst="rightArrow">
+            <a:avLst/>
+          </a:prstGeom>
+        </p:spPr>
+        <p:style>
+          <a:lnRef idx="1">
+            <a:schemeClr val="accent6"/>
+          </a:lnRef>
+          <a:fillRef idx="2">
+            <a:schemeClr val="accent6"/>
+          </a:fillRef>
+          <a:effectRef idx="1">
+            <a:schemeClr val="accent6"/>
+          </a:effectRef>
+          <a:fontRef idx="minor">
+            <a:schemeClr val="dk1"/>
+          </a:fontRef>
+        </p:style>
+        <p:txBody>
+          <a:bodyPr rtlCol="0" anchor="ctr"/>
+          <a:lstStyle/>
+          <a:p>
+            <a:pPr algn="ctr"/>
+            <a:endParaRPr lang="en-GB"/>
+          </a:p>
+        </p:txBody>
+      </p:sp>
+      <p:sp>
+        <p:nvSpPr>
+          <p:cNvPr id="19" name="Arrow: Right 18">
+            <a:extLst>
+              <a:ext uri="{FF2B5EF4-FFF2-40B4-BE49-F238E27FC236}">
+                <a16:creationId xmlns:a16="http://schemas.microsoft.com/office/drawing/2014/main" id="{BFCD41B6-8F16-F132-1954-F718C9E550EC}"/>
+              </a:ext>
+            </a:extLst>
+          </p:cNvPr>
+          <p:cNvSpPr/>
+          <p:nvPr/>
+        </p:nvSpPr>
+        <p:spPr>
+          <a:xfrm>
+            <a:off x="2324375" y="3286380"/>
+            <a:ext cx="448059" cy="174812"/>
+          </a:xfrm>
+          <a:prstGeom prst="rightArrow">
+            <a:avLst/>
+          </a:prstGeom>
+        </p:spPr>
+        <p:style>
+          <a:lnRef idx="1">
+            <a:schemeClr val="accent6"/>
+          </a:lnRef>
+          <a:fillRef idx="2">
+            <a:schemeClr val="accent6"/>
+          </a:fillRef>
+          <a:effectRef idx="1">
+            <a:schemeClr val="accent6"/>
+          </a:effectRef>
+          <a:fontRef idx="minor">
+            <a:schemeClr val="dk1"/>
+          </a:fontRef>
+        </p:style>
+        <p:txBody>
+          <a:bodyPr rtlCol="0" anchor="ctr"/>
+          <a:lstStyle/>
+          <a:p>
+            <a:pPr algn="ctr"/>
+            <a:endParaRPr lang="en-GB"/>
+          </a:p>
+        </p:txBody>
+      </p:sp>
+      <p:sp>
+        <p:nvSpPr>
+          <p:cNvPr id="20" name="Arrow: Right 19">
+            <a:extLst>
+              <a:ext uri="{FF2B5EF4-FFF2-40B4-BE49-F238E27FC236}">
+                <a16:creationId xmlns:a16="http://schemas.microsoft.com/office/drawing/2014/main" id="{797F056B-D9FE-9B35-390E-C21FFDE80454}"/>
+              </a:ext>
+            </a:extLst>
+          </p:cNvPr>
+          <p:cNvSpPr/>
+          <p:nvPr/>
+        </p:nvSpPr>
+        <p:spPr>
+          <a:xfrm>
+            <a:off x="2324375" y="3655321"/>
+            <a:ext cx="448059" cy="174812"/>
+          </a:xfrm>
+          <a:prstGeom prst="rightArrow">
+            <a:avLst/>
+          </a:prstGeom>
+        </p:spPr>
+        <p:style>
+          <a:lnRef idx="1">
+            <a:schemeClr val="accent6"/>
+          </a:lnRef>
+          <a:fillRef idx="2">
+            <a:schemeClr val="accent6"/>
+          </a:fillRef>
+          <a:effectRef idx="1">
+            <a:schemeClr val="accent6"/>
+          </a:effectRef>
+          <a:fontRef idx="minor">
+            <a:schemeClr val="dk1"/>
+          </a:fontRef>
+        </p:style>
+        <p:txBody>
+          <a:bodyPr rtlCol="0" anchor="ctr"/>
+          <a:lstStyle/>
+          <a:p>
+            <a:pPr algn="ctr"/>
+            <a:endParaRPr lang="en-GB"/>
+          </a:p>
+        </p:txBody>
+      </p:sp>
+      <p:sp>
+        <p:nvSpPr>
+          <p:cNvPr id="21" name="Arrow: Right 20">
+            <a:extLst>
+              <a:ext uri="{FF2B5EF4-FFF2-40B4-BE49-F238E27FC236}">
+                <a16:creationId xmlns:a16="http://schemas.microsoft.com/office/drawing/2014/main" id="{952E3ABB-C57B-3D2D-5AC6-C8BDF2BA9AAC}"/>
+              </a:ext>
+            </a:extLst>
+          </p:cNvPr>
+          <p:cNvSpPr/>
+          <p:nvPr/>
+        </p:nvSpPr>
+        <p:spPr>
+          <a:xfrm>
+            <a:off x="535729" y="2979086"/>
+            <a:ext cx="687953" cy="268660"/>
+          </a:xfrm>
+          <a:prstGeom prst="rightArrow">
+            <a:avLst/>
+          </a:prstGeom>
+        </p:spPr>
+        <p:style>
+          <a:lnRef idx="1">
+            <a:schemeClr val="accent5"/>
+          </a:lnRef>
+          <a:fillRef idx="2">
+            <a:schemeClr val="accent5"/>
+          </a:fillRef>
+          <a:effectRef idx="1">
+            <a:schemeClr val="accent5"/>
+          </a:effectRef>
+          <a:fontRef idx="minor">
+            <a:schemeClr val="dk1"/>
+          </a:fontRef>
+        </p:style>
+        <p:txBody>
+          <a:bodyPr rtlCol="0" anchor="ctr"/>
+          <a:lstStyle/>
+          <a:p>
+            <a:pPr algn="ctr"/>
+            <a:r>
+              <a:rPr lang="en-GB" dirty="0"/>
+              <a:t>new</a:t>
+            </a:r>
+          </a:p>
+        </p:txBody>
+      </p:sp>
+      <p:sp>
+        <p:nvSpPr>
+          <p:cNvPr id="22" name="Arrow: Right 21">
+            <a:extLst>
+              <a:ext uri="{FF2B5EF4-FFF2-40B4-BE49-F238E27FC236}">
+                <a16:creationId xmlns:a16="http://schemas.microsoft.com/office/drawing/2014/main" id="{4C81669E-EBC1-429A-E6C4-10001956F1EF}"/>
+              </a:ext>
+            </a:extLst>
+          </p:cNvPr>
+          <p:cNvSpPr/>
+          <p:nvPr/>
+        </p:nvSpPr>
+        <p:spPr>
+          <a:xfrm>
+            <a:off x="398388" y="3373786"/>
+            <a:ext cx="1107766" cy="241535"/>
+          </a:xfrm>
+          <a:prstGeom prst="rightArrow">
+            <a:avLst/>
+          </a:prstGeom>
+        </p:spPr>
+        <p:style>
+          <a:lnRef idx="1">
+            <a:schemeClr val="accent6"/>
+          </a:lnRef>
+          <a:fillRef idx="2">
+            <a:schemeClr val="accent6"/>
+          </a:fillRef>
+          <a:effectRef idx="1">
+            <a:schemeClr val="accent6"/>
+          </a:effectRef>
+          <a:fontRef idx="minor">
+            <a:schemeClr val="dk1"/>
+          </a:fontRef>
+        </p:style>
+        <p:txBody>
+          <a:bodyPr rtlCol="0" anchor="ctr"/>
+          <a:lstStyle/>
+          <a:p>
+            <a:pPr algn="ctr"/>
+            <a:r>
+              <a:rPr lang="en-GB" dirty="0"/>
+              <a:t>refactored</a:t>
+            </a:r>
+          </a:p>
+        </p:txBody>
+      </p:sp>
+      <p:sp>
+        <p:nvSpPr>
+          <p:cNvPr id="23" name="Arrow: Right 22">
+            <a:extLst>
+              <a:ext uri="{FF2B5EF4-FFF2-40B4-BE49-F238E27FC236}">
+                <a16:creationId xmlns:a16="http://schemas.microsoft.com/office/drawing/2014/main" id="{F31ADD09-6AD3-2CB3-4129-0968A39EFA80}"/>
+              </a:ext>
+            </a:extLst>
+          </p:cNvPr>
+          <p:cNvSpPr/>
+          <p:nvPr/>
+        </p:nvSpPr>
+        <p:spPr>
+          <a:xfrm>
+            <a:off x="4513098" y="2272745"/>
+            <a:ext cx="448059" cy="174812"/>
+          </a:xfrm>
+          <a:prstGeom prst="rightArrow">
+            <a:avLst/>
+          </a:prstGeom>
+        </p:spPr>
+        <p:style>
+          <a:lnRef idx="1">
+            <a:schemeClr val="accent5"/>
+          </a:lnRef>
+          <a:fillRef idx="2">
+            <a:schemeClr val="accent5"/>
+          </a:fillRef>
+          <a:effectRef idx="1">
+            <a:schemeClr val="accent5"/>
+          </a:effectRef>
+          <a:fontRef idx="minor">
+            <a:schemeClr val="dk1"/>
+          </a:fontRef>
+        </p:style>
+        <p:txBody>
+          <a:bodyPr rtlCol="0" anchor="ctr"/>
+          <a:lstStyle/>
+          <a:p>
+            <a:pPr algn="ctr"/>
+            <a:endParaRPr lang="en-GB"/>
+          </a:p>
+        </p:txBody>
+      </p:sp>
+      <p:sp>
+        <p:nvSpPr>
+          <p:cNvPr id="24" name="Arrow: Right 23">
+            <a:extLst>
+              <a:ext uri="{FF2B5EF4-FFF2-40B4-BE49-F238E27FC236}">
+                <a16:creationId xmlns:a16="http://schemas.microsoft.com/office/drawing/2014/main" id="{15CA7925-EC96-AE4B-33AB-902334C512BF}"/>
+              </a:ext>
+            </a:extLst>
+          </p:cNvPr>
+          <p:cNvSpPr/>
+          <p:nvPr/>
+        </p:nvSpPr>
+        <p:spPr>
+          <a:xfrm>
+            <a:off x="4513097" y="2508247"/>
+            <a:ext cx="448059" cy="174812"/>
+          </a:xfrm>
+          <a:prstGeom prst="rightArrow">
+            <a:avLst/>
+          </a:prstGeom>
+        </p:spPr>
+        <p:style>
+          <a:lnRef idx="1">
+            <a:schemeClr val="accent5"/>
+          </a:lnRef>
+          <a:fillRef idx="2">
+            <a:schemeClr val="accent5"/>
+          </a:fillRef>
+          <a:effectRef idx="1">
+            <a:schemeClr val="accent5"/>
+          </a:effectRef>
+          <a:fontRef idx="minor">
+            <a:schemeClr val="dk1"/>
+          </a:fontRef>
+        </p:style>
+        <p:txBody>
+          <a:bodyPr rtlCol="0" anchor="ctr"/>
+          <a:lstStyle/>
+          <a:p>
+            <a:pPr algn="ctr"/>
+            <a:endParaRPr lang="en-GB"/>
+          </a:p>
+        </p:txBody>
+      </p:sp>
+      <p:sp>
+        <p:nvSpPr>
+          <p:cNvPr id="25" name="Arrow: Right 24">
+            <a:extLst>
+              <a:ext uri="{FF2B5EF4-FFF2-40B4-BE49-F238E27FC236}">
+                <a16:creationId xmlns:a16="http://schemas.microsoft.com/office/drawing/2014/main" id="{D7C3D827-080B-2241-134B-8EFBA55A7882}"/>
+              </a:ext>
+            </a:extLst>
+          </p:cNvPr>
+          <p:cNvSpPr/>
+          <p:nvPr/>
+        </p:nvSpPr>
+        <p:spPr>
+          <a:xfrm>
+            <a:off x="4532071" y="1608299"/>
+            <a:ext cx="448059" cy="174812"/>
+          </a:xfrm>
+          <a:prstGeom prst="rightArrow">
+            <a:avLst/>
+          </a:prstGeom>
+        </p:spPr>
+        <p:style>
+          <a:lnRef idx="1">
+            <a:schemeClr val="accent6"/>
+          </a:lnRef>
+          <a:fillRef idx="2">
+            <a:schemeClr val="accent6"/>
+          </a:fillRef>
+          <a:effectRef idx="1">
+            <a:schemeClr val="accent6"/>
+          </a:effectRef>
+          <a:fontRef idx="minor">
+            <a:schemeClr val="dk1"/>
+          </a:fontRef>
+        </p:style>
+        <p:txBody>
+          <a:bodyPr rtlCol="0" anchor="ctr"/>
+          <a:lstStyle/>
+          <a:p>
+            <a:pPr algn="ctr"/>
+            <a:endParaRPr lang="en-GB"/>
+          </a:p>
+        </p:txBody>
+      </p:sp>
+      <p:sp>
+        <p:nvSpPr>
+          <p:cNvPr id="26" name="Arrow: Right 25">
+            <a:extLst>
+              <a:ext uri="{FF2B5EF4-FFF2-40B4-BE49-F238E27FC236}">
+                <a16:creationId xmlns:a16="http://schemas.microsoft.com/office/drawing/2014/main" id="{D0822BA2-1907-7209-7BBE-C166DFF4B7E0}"/>
+              </a:ext>
+            </a:extLst>
+          </p:cNvPr>
+          <p:cNvSpPr/>
+          <p:nvPr/>
+        </p:nvSpPr>
+        <p:spPr>
+          <a:xfrm>
+            <a:off x="4521804" y="3394479"/>
+            <a:ext cx="448059" cy="174812"/>
+          </a:xfrm>
+          <a:prstGeom prst="rightArrow">
+            <a:avLst/>
+          </a:prstGeom>
+        </p:spPr>
+        <p:style>
+          <a:lnRef idx="1">
+            <a:schemeClr val="accent6"/>
+          </a:lnRef>
+          <a:fillRef idx="2">
+            <a:schemeClr val="accent6"/>
+          </a:fillRef>
+          <a:effectRef idx="1">
+            <a:schemeClr val="accent6"/>
+          </a:effectRef>
+          <a:fontRef idx="minor">
+            <a:schemeClr val="dk1"/>
+          </a:fontRef>
+        </p:style>
+        <p:txBody>
+          <a:bodyPr rtlCol="0" anchor="ctr"/>
+          <a:lstStyle/>
+          <a:p>
+            <a:pPr algn="ctr"/>
+            <a:endParaRPr lang="en-GB"/>
+          </a:p>
+        </p:txBody>
+      </p:sp>
+      <p:sp>
+        <p:nvSpPr>
+          <p:cNvPr id="27" name="Arrow: Right 26">
+            <a:extLst>
+              <a:ext uri="{FF2B5EF4-FFF2-40B4-BE49-F238E27FC236}">
+                <a16:creationId xmlns:a16="http://schemas.microsoft.com/office/drawing/2014/main" id="{529D2CDE-64B4-5007-425C-920912F1E235}"/>
+              </a:ext>
+            </a:extLst>
+          </p:cNvPr>
+          <p:cNvSpPr/>
+          <p:nvPr/>
+        </p:nvSpPr>
+        <p:spPr>
+          <a:xfrm>
+            <a:off x="4521803" y="3740734"/>
+            <a:ext cx="448059" cy="174812"/>
+          </a:xfrm>
+          <a:prstGeom prst="rightArrow">
+            <a:avLst/>
+          </a:prstGeom>
+        </p:spPr>
+        <p:style>
+          <a:lnRef idx="1">
+            <a:schemeClr val="accent6"/>
+          </a:lnRef>
+          <a:fillRef idx="2">
+            <a:schemeClr val="accent6"/>
+          </a:fillRef>
+          <a:effectRef idx="1">
+            <a:schemeClr val="accent6"/>
+          </a:effectRef>
+          <a:fontRef idx="minor">
+            <a:schemeClr val="dk1"/>
+          </a:fontRef>
+        </p:style>
+        <p:txBody>
+          <a:bodyPr rtlCol="0" anchor="ctr"/>
+          <a:lstStyle/>
+          <a:p>
+            <a:pPr algn="ctr"/>
+            <a:endParaRPr lang="en-GB"/>
+          </a:p>
+        </p:txBody>
+      </p:sp>
+      <p:sp>
+        <p:nvSpPr>
+          <p:cNvPr id="28" name="Arrow: Right 27">
+            <a:extLst>
+              <a:ext uri="{FF2B5EF4-FFF2-40B4-BE49-F238E27FC236}">
+                <a16:creationId xmlns:a16="http://schemas.microsoft.com/office/drawing/2014/main" id="{70D0126A-F3AB-CDDA-1ED9-84ED3D982A97}"/>
+              </a:ext>
+            </a:extLst>
+          </p:cNvPr>
+          <p:cNvSpPr/>
+          <p:nvPr/>
+        </p:nvSpPr>
+        <p:spPr>
+          <a:xfrm>
+            <a:off x="4521802" y="4511941"/>
+            <a:ext cx="448059" cy="174812"/>
+          </a:xfrm>
+          <a:prstGeom prst="rightArrow">
+            <a:avLst/>
+          </a:prstGeom>
+        </p:spPr>
+        <p:style>
+          <a:lnRef idx="1">
+            <a:schemeClr val="accent5"/>
+          </a:lnRef>
+          <a:fillRef idx="2">
+            <a:schemeClr val="accent5"/>
+          </a:fillRef>
+          <a:effectRef idx="1">
+            <a:schemeClr val="accent5"/>
+          </a:effectRef>
+          <a:fontRef idx="minor">
+            <a:schemeClr val="dk1"/>
+          </a:fontRef>
+        </p:style>
+        <p:txBody>
+          <a:bodyPr rtlCol="0" anchor="ctr"/>
+          <a:lstStyle/>
+          <a:p>
+            <a:pPr algn="ctr"/>
+            <a:endParaRPr lang="en-GB"/>
+          </a:p>
+        </p:txBody>
+      </p:sp>
+      <p:sp>
+        <p:nvSpPr>
+          <p:cNvPr id="29" name="Arrow: Right 28">
+            <a:extLst>
+              <a:ext uri="{FF2B5EF4-FFF2-40B4-BE49-F238E27FC236}">
+                <a16:creationId xmlns:a16="http://schemas.microsoft.com/office/drawing/2014/main" id="{87A7F74B-C82B-4368-655E-DAFFAAE33008}"/>
+              </a:ext>
+            </a:extLst>
+          </p:cNvPr>
+          <p:cNvSpPr/>
+          <p:nvPr/>
+        </p:nvSpPr>
+        <p:spPr>
+          <a:xfrm>
+            <a:off x="4532071" y="4773187"/>
+            <a:ext cx="448059" cy="174812"/>
+          </a:xfrm>
+          <a:prstGeom prst="rightArrow">
+            <a:avLst/>
+          </a:prstGeom>
+        </p:spPr>
+        <p:style>
+          <a:lnRef idx="1">
+            <a:schemeClr val="accent5"/>
+          </a:lnRef>
+          <a:fillRef idx="2">
+            <a:schemeClr val="accent5"/>
+          </a:fillRef>
+          <a:effectRef idx="1">
+            <a:schemeClr val="accent5"/>
+          </a:effectRef>
+          <a:fontRef idx="minor">
+            <a:schemeClr val="dk1"/>
+          </a:fontRef>
+        </p:style>
+        <p:txBody>
+          <a:bodyPr rtlCol="0" anchor="ctr"/>
+          <a:lstStyle/>
+          <a:p>
+            <a:pPr algn="ctr"/>
+            <a:endParaRPr lang="en-GB"/>
+          </a:p>
+        </p:txBody>
+      </p:sp>
+    </p:spTree>
+    <p:extLst>
+      <p:ext uri="{BB962C8B-B14F-4D97-AF65-F5344CB8AC3E}">
+        <p14:creationId xmlns:p14="http://schemas.microsoft.com/office/powerpoint/2010/main" val="1998632435"/>
+      </p:ext>
+    </p:extLst>
+  </p:cSld>
+  <p:clrMapOvr>
+    <a:masterClrMapping/>
+  </p:clrMapOvr>
+</p:sld>
+</file>
+
+<file path=ppt/slides/slide28.xml><?xml version="1.0" encoding="utf-8"?>
+<p:sld xmlns:a="http://schemas.openxmlformats.org/drawingml/2006/main" xmlns:r="http://schemas.openxmlformats.org/officeDocument/2006/relationships" xmlns:p="http://schemas.openxmlformats.org/presentationml/2006/main">
+  <p:cSld>
+    <p:spTree>
+      <p:nvGrpSpPr>
+        <p:cNvPr id="1" name=""/>
+        <p:cNvGrpSpPr/>
+        <p:nvPr/>
+      </p:nvGrpSpPr>
+      <p:grpSpPr>
+        <a:xfrm>
+          <a:off x="0" y="0"/>
+          <a:ext cx="0" cy="0"/>
+          <a:chOff x="0" y="0"/>
+          <a:chExt cx="0" cy="0"/>
+        </a:xfrm>
+      </p:grpSpPr>
+      <p:sp>
+        <p:nvSpPr>
+          <p:cNvPr id="2" name="Title 1">
+            <a:extLst>
+              <a:ext uri="{FF2B5EF4-FFF2-40B4-BE49-F238E27FC236}">
+                <a16:creationId xmlns:a16="http://schemas.microsoft.com/office/drawing/2014/main" id="{E100C4C4-ECC7-18BE-A34A-75F9B1031E02}"/>
+              </a:ext>
+            </a:extLst>
+          </p:cNvPr>
+          <p:cNvSpPr>
+            <a:spLocks noGrp="1"/>
+          </p:cNvSpPr>
+          <p:nvPr>
+            <p:ph type="title"/>
+          </p:nvPr>
+        </p:nvSpPr>
+        <p:spPr/>
+        <p:txBody>
+          <a:bodyPr>
+            <a:normAutofit fontScale="90000"/>
+          </a:bodyPr>
+          <a:lstStyle/>
+          <a:p>
+            <a:r>
+              <a:rPr lang="en-GB" dirty="0"/>
+              <a:t>OOp101-1C2 - __</a:t>
+            </a:r>
+            <a:r>
+              <a:rPr lang="en-GB" dirty="0" err="1"/>
+              <a:t>init</a:t>
+            </a:r>
+            <a:r>
+              <a:rPr lang="en-GB" dirty="0"/>
+              <a:t>__ refactored</a:t>
+            </a:r>
+          </a:p>
+        </p:txBody>
+      </p:sp>
+      <p:pic>
+        <p:nvPicPr>
+          <p:cNvPr id="5" name="Picture 4">
+            <a:extLst>
+              <a:ext uri="{FF2B5EF4-FFF2-40B4-BE49-F238E27FC236}">
+                <a16:creationId xmlns:a16="http://schemas.microsoft.com/office/drawing/2014/main" id="{88D273F8-AA76-F111-3A77-7D0D0E8BBFD9}"/>
+              </a:ext>
+            </a:extLst>
+          </p:cNvPr>
+          <p:cNvPicPr>
+            <a:picLocks noChangeAspect="1"/>
+          </p:cNvPicPr>
+          <p:nvPr/>
+        </p:nvPicPr>
+        <p:blipFill>
+          <a:blip r:embed="rId2"/>
+          <a:stretch>
+            <a:fillRect/>
+          </a:stretch>
+        </p:blipFill>
+        <p:spPr>
+          <a:xfrm>
+            <a:off x="6919759" y="913839"/>
+            <a:ext cx="2153924" cy="3315820"/>
+          </a:xfrm>
+          <a:prstGeom prst="rect">
+            <a:avLst/>
+          </a:prstGeom>
+        </p:spPr>
+      </p:pic>
+      <p:pic>
+        <p:nvPicPr>
+          <p:cNvPr id="7" name="Picture 6">
+            <a:extLst>
+              <a:ext uri="{FF2B5EF4-FFF2-40B4-BE49-F238E27FC236}">
+                <a16:creationId xmlns:a16="http://schemas.microsoft.com/office/drawing/2014/main" id="{5A493AD3-5E0B-9BA7-9E61-EF1CAFEC276D}"/>
+              </a:ext>
+            </a:extLst>
+          </p:cNvPr>
+          <p:cNvPicPr>
+            <a:picLocks noChangeAspect="1"/>
+          </p:cNvPicPr>
+          <p:nvPr/>
+        </p:nvPicPr>
+        <p:blipFill>
+          <a:blip r:embed="rId3"/>
+          <a:stretch>
+            <a:fillRect/>
+          </a:stretch>
+        </p:blipFill>
+        <p:spPr>
+          <a:xfrm>
+            <a:off x="70317" y="976312"/>
+            <a:ext cx="6724650" cy="3190875"/>
+          </a:xfrm>
+          <a:prstGeom prst="rect">
+            <a:avLst/>
+          </a:prstGeom>
+        </p:spPr>
+      </p:pic>
+    </p:spTree>
+    <p:extLst>
+      <p:ext uri="{BB962C8B-B14F-4D97-AF65-F5344CB8AC3E}">
+        <p14:creationId xmlns:p14="http://schemas.microsoft.com/office/powerpoint/2010/main" val="3960066381"/>
+      </p:ext>
+    </p:extLst>
+  </p:cSld>
+  <p:clrMapOvr>
+    <a:masterClrMapping/>
+  </p:clrMapOvr>
+</p:sld>
+</file>
+
+<file path=ppt/slides/slide29.xml><?xml version="1.0" encoding="utf-8"?>
+<p:sld xmlns:a="http://schemas.openxmlformats.org/drawingml/2006/main" xmlns:r="http://schemas.openxmlformats.org/officeDocument/2006/relationships" xmlns:p="http://schemas.openxmlformats.org/presentationml/2006/main">
+  <p:cSld>
+    <p:spTree>
+      <p:nvGrpSpPr>
+        <p:cNvPr id="1" name=""/>
+        <p:cNvGrpSpPr/>
+        <p:nvPr/>
+      </p:nvGrpSpPr>
+      <p:grpSpPr>
+        <a:xfrm>
+          <a:off x="0" y="0"/>
+          <a:ext cx="0" cy="0"/>
+          <a:chOff x="0" y="0"/>
+          <a:chExt cx="0" cy="0"/>
+        </a:xfrm>
+      </p:grpSpPr>
+      <p:sp>
+        <p:nvSpPr>
+          <p:cNvPr id="2" name="Title 1">
+            <a:extLst>
+              <a:ext uri="{FF2B5EF4-FFF2-40B4-BE49-F238E27FC236}">
+                <a16:creationId xmlns:a16="http://schemas.microsoft.com/office/drawing/2014/main" id="{E100C4C4-ECC7-18BE-A34A-75F9B1031E02}"/>
+              </a:ext>
+            </a:extLst>
+          </p:cNvPr>
+          <p:cNvSpPr>
+            <a:spLocks noGrp="1"/>
+          </p:cNvSpPr>
+          <p:nvPr>
+            <p:ph type="title"/>
+          </p:nvPr>
+        </p:nvSpPr>
+        <p:spPr/>
+        <p:txBody>
+          <a:bodyPr>
+            <a:normAutofit fontScale="90000"/>
+          </a:bodyPr>
+          <a:lstStyle/>
+          <a:p>
+            <a:r>
+              <a:rPr lang="en-GB" dirty="0"/>
+              <a:t>OOp101-1C2 – Getter &amp; Setter for position</a:t>
+            </a:r>
+          </a:p>
+        </p:txBody>
+      </p:sp>
+      <p:pic>
+        <p:nvPicPr>
+          <p:cNvPr id="5" name="Picture 4">
+            <a:extLst>
+              <a:ext uri="{FF2B5EF4-FFF2-40B4-BE49-F238E27FC236}">
+                <a16:creationId xmlns:a16="http://schemas.microsoft.com/office/drawing/2014/main" id="{88D273F8-AA76-F111-3A77-7D0D0E8BBFD9}"/>
+              </a:ext>
+            </a:extLst>
+          </p:cNvPr>
+          <p:cNvPicPr>
+            <a:picLocks noChangeAspect="1"/>
+          </p:cNvPicPr>
+          <p:nvPr/>
+        </p:nvPicPr>
+        <p:blipFill>
+          <a:blip r:embed="rId2"/>
+          <a:stretch>
+            <a:fillRect/>
+          </a:stretch>
+        </p:blipFill>
+        <p:spPr>
+          <a:xfrm>
+            <a:off x="6919759" y="913839"/>
+            <a:ext cx="2153924" cy="3315820"/>
+          </a:xfrm>
+          <a:prstGeom prst="rect">
+            <a:avLst/>
+          </a:prstGeom>
+        </p:spPr>
+      </p:pic>
+      <p:pic>
+        <p:nvPicPr>
+          <p:cNvPr id="4" name="Picture 3">
+            <a:extLst>
+              <a:ext uri="{FF2B5EF4-FFF2-40B4-BE49-F238E27FC236}">
+                <a16:creationId xmlns:a16="http://schemas.microsoft.com/office/drawing/2014/main" id="{A635CA1D-D40B-C55E-339E-B2AE23759414}"/>
+              </a:ext>
+            </a:extLst>
+          </p:cNvPr>
+          <p:cNvPicPr>
+            <a:picLocks noChangeAspect="1"/>
+          </p:cNvPicPr>
+          <p:nvPr/>
+        </p:nvPicPr>
+        <p:blipFill>
+          <a:blip r:embed="rId3"/>
+          <a:stretch>
+            <a:fillRect/>
+          </a:stretch>
+        </p:blipFill>
+        <p:spPr>
+          <a:xfrm>
+            <a:off x="311700" y="1211075"/>
+            <a:ext cx="5419725" cy="2600325"/>
+          </a:xfrm>
+          <a:prstGeom prst="rect">
+            <a:avLst/>
+          </a:prstGeom>
+        </p:spPr>
+      </p:pic>
+    </p:spTree>
+    <p:extLst>
+      <p:ext uri="{BB962C8B-B14F-4D97-AF65-F5344CB8AC3E}">
+        <p14:creationId xmlns:p14="http://schemas.microsoft.com/office/powerpoint/2010/main" val="2174637034"/>
+      </p:ext>
+    </p:extLst>
+  </p:cSld>
+  <p:clrMapOvr>
+    <a:masterClrMapping/>
+  </p:clrMapOvr>
+</p:sld>
+</file>
+
 <file path=ppt/slides/slide3.xml><?xml version="1.0" encoding="utf-8"?>
 <p:sld xmlns:a="http://schemas.openxmlformats.org/drawingml/2006/main" xmlns:r="http://schemas.openxmlformats.org/officeDocument/2006/relationships" xmlns:p="http://schemas.openxmlformats.org/presentationml/2006/main">
   <p:cSld>
@@ -14669,6 +16499,1308 @@
         </p:txBody>
       </p:sp>
     </p:spTree>
+  </p:cSld>
+  <p:clrMapOvr>
+    <a:masterClrMapping/>
+  </p:clrMapOvr>
+</p:sld>
+</file>
+
+<file path=ppt/slides/slide30.xml><?xml version="1.0" encoding="utf-8"?>
+<p:sld xmlns:a="http://schemas.openxmlformats.org/drawingml/2006/main" xmlns:r="http://schemas.openxmlformats.org/officeDocument/2006/relationships" xmlns:p="http://schemas.openxmlformats.org/presentationml/2006/main">
+  <p:cSld>
+    <p:spTree>
+      <p:nvGrpSpPr>
+        <p:cNvPr id="1" name=""/>
+        <p:cNvGrpSpPr/>
+        <p:nvPr/>
+      </p:nvGrpSpPr>
+      <p:grpSpPr>
+        <a:xfrm>
+          <a:off x="0" y="0"/>
+          <a:ext cx="0" cy="0"/>
+          <a:chOff x="0" y="0"/>
+          <a:chExt cx="0" cy="0"/>
+        </a:xfrm>
+      </p:grpSpPr>
+      <p:sp>
+        <p:nvSpPr>
+          <p:cNvPr id="2" name="Title 1">
+            <a:extLst>
+              <a:ext uri="{FF2B5EF4-FFF2-40B4-BE49-F238E27FC236}">
+                <a16:creationId xmlns:a16="http://schemas.microsoft.com/office/drawing/2014/main" id="{E100C4C4-ECC7-18BE-A34A-75F9B1031E02}"/>
+              </a:ext>
+            </a:extLst>
+          </p:cNvPr>
+          <p:cNvSpPr>
+            <a:spLocks noGrp="1"/>
+          </p:cNvSpPr>
+          <p:nvPr>
+            <p:ph type="title"/>
+          </p:nvPr>
+        </p:nvSpPr>
+        <p:spPr/>
+        <p:txBody>
+          <a:bodyPr>
+            <a:normAutofit fontScale="90000"/>
+          </a:bodyPr>
+          <a:lstStyle/>
+          <a:p>
+            <a:r>
+              <a:rPr lang="en-GB" dirty="0"/>
+              <a:t>OOp101-1C2 – helper method : </a:t>
+            </a:r>
+            <a:r>
+              <a:rPr lang="en-GB" dirty="0" err="1"/>
+              <a:t>getKeyIdString</a:t>
+            </a:r>
+            <a:endParaRPr lang="en-GB" dirty="0"/>
+          </a:p>
+        </p:txBody>
+      </p:sp>
+      <p:pic>
+        <p:nvPicPr>
+          <p:cNvPr id="5" name="Picture 4">
+            <a:extLst>
+              <a:ext uri="{FF2B5EF4-FFF2-40B4-BE49-F238E27FC236}">
+                <a16:creationId xmlns:a16="http://schemas.microsoft.com/office/drawing/2014/main" id="{88D273F8-AA76-F111-3A77-7D0D0E8BBFD9}"/>
+              </a:ext>
+            </a:extLst>
+          </p:cNvPr>
+          <p:cNvPicPr>
+            <a:picLocks noChangeAspect="1"/>
+          </p:cNvPicPr>
+          <p:nvPr/>
+        </p:nvPicPr>
+        <p:blipFill>
+          <a:blip r:embed="rId2"/>
+          <a:stretch>
+            <a:fillRect/>
+          </a:stretch>
+        </p:blipFill>
+        <p:spPr>
+          <a:xfrm>
+            <a:off x="6990076" y="1570175"/>
+            <a:ext cx="2153924" cy="3315820"/>
+          </a:xfrm>
+          <a:prstGeom prst="rect">
+            <a:avLst/>
+          </a:prstGeom>
+        </p:spPr>
+      </p:pic>
+      <p:pic>
+        <p:nvPicPr>
+          <p:cNvPr id="6" name="Picture 5">
+            <a:extLst>
+              <a:ext uri="{FF2B5EF4-FFF2-40B4-BE49-F238E27FC236}">
+                <a16:creationId xmlns:a16="http://schemas.microsoft.com/office/drawing/2014/main" id="{58810E6B-D6FA-44F1-F367-E965801E7849}"/>
+              </a:ext>
+            </a:extLst>
+          </p:cNvPr>
+          <p:cNvPicPr>
+            <a:picLocks noChangeAspect="1"/>
+          </p:cNvPicPr>
+          <p:nvPr/>
+        </p:nvPicPr>
+        <p:blipFill>
+          <a:blip r:embed="rId3"/>
+          <a:stretch>
+            <a:fillRect/>
+          </a:stretch>
+        </p:blipFill>
+        <p:spPr>
+          <a:xfrm>
+            <a:off x="151126" y="1091684"/>
+            <a:ext cx="6838950" cy="1104900"/>
+          </a:xfrm>
+          <a:prstGeom prst="rect">
+            <a:avLst/>
+          </a:prstGeom>
+        </p:spPr>
+      </p:pic>
+    </p:spTree>
+    <p:extLst>
+      <p:ext uri="{BB962C8B-B14F-4D97-AF65-F5344CB8AC3E}">
+        <p14:creationId xmlns:p14="http://schemas.microsoft.com/office/powerpoint/2010/main" val="2131309554"/>
+      </p:ext>
+    </p:extLst>
+  </p:cSld>
+  <p:clrMapOvr>
+    <a:masterClrMapping/>
+  </p:clrMapOvr>
+</p:sld>
+</file>
+
+<file path=ppt/slides/slide31.xml><?xml version="1.0" encoding="utf-8"?>
+<p:sld xmlns:a="http://schemas.openxmlformats.org/drawingml/2006/main" xmlns:r="http://schemas.openxmlformats.org/officeDocument/2006/relationships" xmlns:p="http://schemas.openxmlformats.org/presentationml/2006/main">
+  <p:cSld>
+    <p:spTree>
+      <p:nvGrpSpPr>
+        <p:cNvPr id="1" name=""/>
+        <p:cNvGrpSpPr/>
+        <p:nvPr/>
+      </p:nvGrpSpPr>
+      <p:grpSpPr>
+        <a:xfrm>
+          <a:off x="0" y="0"/>
+          <a:ext cx="0" cy="0"/>
+          <a:chOff x="0" y="0"/>
+          <a:chExt cx="0" cy="0"/>
+        </a:xfrm>
+      </p:grpSpPr>
+      <p:sp>
+        <p:nvSpPr>
+          <p:cNvPr id="2" name="Title 1">
+            <a:extLst>
+              <a:ext uri="{FF2B5EF4-FFF2-40B4-BE49-F238E27FC236}">
+                <a16:creationId xmlns:a16="http://schemas.microsoft.com/office/drawing/2014/main" id="{E100C4C4-ECC7-18BE-A34A-75F9B1031E02}"/>
+              </a:ext>
+            </a:extLst>
+          </p:cNvPr>
+          <p:cNvSpPr>
+            <a:spLocks noGrp="1"/>
+          </p:cNvSpPr>
+          <p:nvPr>
+            <p:ph type="title"/>
+          </p:nvPr>
+        </p:nvSpPr>
+        <p:spPr>
+          <a:xfrm>
+            <a:off x="311700" y="95402"/>
+            <a:ext cx="8520600" cy="572700"/>
+          </a:xfrm>
+        </p:spPr>
+        <p:txBody>
+          <a:bodyPr>
+            <a:normAutofit fontScale="90000"/>
+          </a:bodyPr>
+          <a:lstStyle/>
+          <a:p>
+            <a:r>
+              <a:rPr lang="en-GB" dirty="0"/>
+              <a:t>OOp101-1C2 – helper method : </a:t>
+            </a:r>
+            <a:r>
+              <a:rPr lang="en-GB" dirty="0" err="1"/>
+              <a:t>wasPressed</a:t>
+            </a:r>
+            <a:endParaRPr lang="en-GB" dirty="0"/>
+          </a:p>
+        </p:txBody>
+      </p:sp>
+      <p:pic>
+        <p:nvPicPr>
+          <p:cNvPr id="5" name="Picture 4">
+            <a:extLst>
+              <a:ext uri="{FF2B5EF4-FFF2-40B4-BE49-F238E27FC236}">
+                <a16:creationId xmlns:a16="http://schemas.microsoft.com/office/drawing/2014/main" id="{88D273F8-AA76-F111-3A77-7D0D0E8BBFD9}"/>
+              </a:ext>
+            </a:extLst>
+          </p:cNvPr>
+          <p:cNvPicPr>
+            <a:picLocks noChangeAspect="1"/>
+          </p:cNvPicPr>
+          <p:nvPr/>
+        </p:nvPicPr>
+        <p:blipFill>
+          <a:blip r:embed="rId2"/>
+          <a:stretch>
+            <a:fillRect/>
+          </a:stretch>
+        </p:blipFill>
+        <p:spPr>
+          <a:xfrm>
+            <a:off x="6990076" y="1570175"/>
+            <a:ext cx="2153924" cy="3315820"/>
+          </a:xfrm>
+          <a:prstGeom prst="rect">
+            <a:avLst/>
+          </a:prstGeom>
+        </p:spPr>
+      </p:pic>
+      <p:pic>
+        <p:nvPicPr>
+          <p:cNvPr id="4" name="Picture 3">
+            <a:extLst>
+              <a:ext uri="{FF2B5EF4-FFF2-40B4-BE49-F238E27FC236}">
+                <a16:creationId xmlns:a16="http://schemas.microsoft.com/office/drawing/2014/main" id="{AFB72F1F-A8B2-20C8-7A9F-A9842AC9FB32}"/>
+              </a:ext>
+            </a:extLst>
+          </p:cNvPr>
+          <p:cNvPicPr>
+            <a:picLocks noChangeAspect="1"/>
+          </p:cNvPicPr>
+          <p:nvPr/>
+        </p:nvPicPr>
+        <p:blipFill>
+          <a:blip r:embed="rId3"/>
+          <a:stretch>
+            <a:fillRect/>
+          </a:stretch>
+        </p:blipFill>
+        <p:spPr>
+          <a:xfrm>
+            <a:off x="226920" y="1789810"/>
+            <a:ext cx="5086350" cy="2876550"/>
+          </a:xfrm>
+          <a:prstGeom prst="rect">
+            <a:avLst/>
+          </a:prstGeom>
+        </p:spPr>
+      </p:pic>
+      <p:sp>
+        <p:nvSpPr>
+          <p:cNvPr id="7" name="TextBox 6">
+            <a:extLst>
+              <a:ext uri="{FF2B5EF4-FFF2-40B4-BE49-F238E27FC236}">
+                <a16:creationId xmlns:a16="http://schemas.microsoft.com/office/drawing/2014/main" id="{04FC837C-1AF6-B82B-9030-6521DF4B736E}"/>
+              </a:ext>
+            </a:extLst>
+          </p:cNvPr>
+          <p:cNvSpPr txBox="1"/>
+          <p:nvPr/>
+        </p:nvSpPr>
+        <p:spPr>
+          <a:xfrm>
+            <a:off x="363071" y="595918"/>
+            <a:ext cx="6423553" cy="954107"/>
+          </a:xfrm>
+          <a:prstGeom prst="rect">
+            <a:avLst/>
+          </a:prstGeom>
+          <a:noFill/>
+        </p:spPr>
+        <p:txBody>
+          <a:bodyPr wrap="none" rtlCol="0">
+            <a:spAutoFit/>
+          </a:bodyPr>
+          <a:lstStyle/>
+          <a:p>
+            <a:r>
+              <a:rPr lang="en-GB" dirty="0"/>
+              <a:t>Returns True if a matching </a:t>
+            </a:r>
+            <a:r>
+              <a:rPr lang="en-GB" dirty="0" err="1"/>
+              <a:t>KeyId</a:t>
+            </a:r>
+            <a:r>
+              <a:rPr lang="en-GB" dirty="0"/>
+              <a:t> (</a:t>
+            </a:r>
+            <a:r>
+              <a:rPr lang="en-GB" dirty="0" err="1"/>
+              <a:t>eg</a:t>
+            </a:r>
+            <a:r>
+              <a:rPr lang="en-GB" dirty="0"/>
+              <a:t> “left”) from </a:t>
+            </a:r>
+            <a:r>
+              <a:rPr lang="en-GB" dirty="0" err="1"/>
+              <a:t>getKeyIdStrings</a:t>
+            </a:r>
+            <a:r>
+              <a:rPr lang="en-GB" dirty="0"/>
+              <a:t> </a:t>
+            </a:r>
+          </a:p>
+          <a:p>
+            <a:r>
+              <a:rPr lang="en-GB" dirty="0"/>
+              <a:t> matches a </a:t>
+            </a:r>
+            <a:r>
+              <a:rPr lang="en-GB" dirty="0" err="1"/>
+              <a:t>pygame.key</a:t>
+            </a:r>
+            <a:r>
+              <a:rPr lang="en-GB" dirty="0"/>
+              <a:t> </a:t>
+            </a:r>
+            <a:r>
+              <a:rPr lang="en-GB" dirty="0" err="1"/>
+              <a:t>keybind</a:t>
+            </a:r>
+            <a:r>
+              <a:rPr lang="en-GB" dirty="0"/>
+              <a:t> set by </a:t>
+            </a:r>
+            <a:r>
+              <a:rPr lang="en-GB" dirty="0" err="1"/>
+              <a:t>add_keybind</a:t>
+            </a:r>
+            <a:r>
+              <a:rPr lang="en-GB" dirty="0"/>
+              <a:t>()</a:t>
+            </a:r>
+          </a:p>
+          <a:p>
+            <a:endParaRPr lang="en-GB" dirty="0"/>
+          </a:p>
+          <a:p>
+            <a:r>
+              <a:rPr lang="en-GB" dirty="0"/>
+              <a:t>Helpful warning messages explaining how to correct a mismatched </a:t>
+            </a:r>
+            <a:r>
+              <a:rPr lang="en-GB" dirty="0" err="1"/>
+              <a:t>keyIdString</a:t>
+            </a:r>
+            <a:endParaRPr lang="en-GB" dirty="0"/>
+          </a:p>
+        </p:txBody>
+      </p:sp>
+    </p:spTree>
+    <p:extLst>
+      <p:ext uri="{BB962C8B-B14F-4D97-AF65-F5344CB8AC3E}">
+        <p14:creationId xmlns:p14="http://schemas.microsoft.com/office/powerpoint/2010/main" val="2757259571"/>
+      </p:ext>
+    </p:extLst>
+  </p:cSld>
+  <p:clrMapOvr>
+    <a:masterClrMapping/>
+  </p:clrMapOvr>
+</p:sld>
+</file>
+
+<file path=ppt/slides/slide32.xml><?xml version="1.0" encoding="utf-8"?>
+<p:sld xmlns:a="http://schemas.openxmlformats.org/drawingml/2006/main" xmlns:r="http://schemas.openxmlformats.org/officeDocument/2006/relationships" xmlns:p="http://schemas.openxmlformats.org/presentationml/2006/main">
+  <p:cSld>
+    <p:spTree>
+      <p:nvGrpSpPr>
+        <p:cNvPr id="1" name=""/>
+        <p:cNvGrpSpPr/>
+        <p:nvPr/>
+      </p:nvGrpSpPr>
+      <p:grpSpPr>
+        <a:xfrm>
+          <a:off x="0" y="0"/>
+          <a:ext cx="0" cy="0"/>
+          <a:chOff x="0" y="0"/>
+          <a:chExt cx="0" cy="0"/>
+        </a:xfrm>
+      </p:grpSpPr>
+      <p:sp>
+        <p:nvSpPr>
+          <p:cNvPr id="2" name="Title 1">
+            <a:extLst>
+              <a:ext uri="{FF2B5EF4-FFF2-40B4-BE49-F238E27FC236}">
+                <a16:creationId xmlns:a16="http://schemas.microsoft.com/office/drawing/2014/main" id="{E100C4C4-ECC7-18BE-A34A-75F9B1031E02}"/>
+              </a:ext>
+            </a:extLst>
+          </p:cNvPr>
+          <p:cNvSpPr>
+            <a:spLocks noGrp="1"/>
+          </p:cNvSpPr>
+          <p:nvPr>
+            <p:ph type="title"/>
+          </p:nvPr>
+        </p:nvSpPr>
+        <p:spPr>
+          <a:xfrm>
+            <a:off x="311700" y="95402"/>
+            <a:ext cx="8520600" cy="572700"/>
+          </a:xfrm>
+        </p:spPr>
+        <p:txBody>
+          <a:bodyPr>
+            <a:normAutofit fontScale="90000"/>
+          </a:bodyPr>
+          <a:lstStyle/>
+          <a:p>
+            <a:r>
+              <a:rPr lang="en-GB" dirty="0"/>
+              <a:t>OOp101-1C2 – refactored </a:t>
+            </a:r>
+            <a:r>
+              <a:rPr lang="en-GB" dirty="0" err="1"/>
+              <a:t>add_key_bind</a:t>
+            </a:r>
+            <a:r>
+              <a:rPr lang="en-GB" dirty="0"/>
+              <a:t>()</a:t>
+            </a:r>
+          </a:p>
+        </p:txBody>
+      </p:sp>
+      <p:pic>
+        <p:nvPicPr>
+          <p:cNvPr id="5" name="Picture 4">
+            <a:extLst>
+              <a:ext uri="{FF2B5EF4-FFF2-40B4-BE49-F238E27FC236}">
+                <a16:creationId xmlns:a16="http://schemas.microsoft.com/office/drawing/2014/main" id="{88D273F8-AA76-F111-3A77-7D0D0E8BBFD9}"/>
+              </a:ext>
+            </a:extLst>
+          </p:cNvPr>
+          <p:cNvPicPr>
+            <a:picLocks noChangeAspect="1"/>
+          </p:cNvPicPr>
+          <p:nvPr/>
+        </p:nvPicPr>
+        <p:blipFill>
+          <a:blip r:embed="rId2"/>
+          <a:stretch>
+            <a:fillRect/>
+          </a:stretch>
+        </p:blipFill>
+        <p:spPr>
+          <a:xfrm>
+            <a:off x="6990076" y="1570175"/>
+            <a:ext cx="2153924" cy="3315820"/>
+          </a:xfrm>
+          <a:prstGeom prst="rect">
+            <a:avLst/>
+          </a:prstGeom>
+        </p:spPr>
+      </p:pic>
+      <p:pic>
+        <p:nvPicPr>
+          <p:cNvPr id="6" name="Picture 5">
+            <a:extLst>
+              <a:ext uri="{FF2B5EF4-FFF2-40B4-BE49-F238E27FC236}">
+                <a16:creationId xmlns:a16="http://schemas.microsoft.com/office/drawing/2014/main" id="{2D12DFCA-C15B-B60F-1648-363DD06B1958}"/>
+              </a:ext>
+            </a:extLst>
+          </p:cNvPr>
+          <p:cNvPicPr>
+            <a:picLocks noChangeAspect="1"/>
+          </p:cNvPicPr>
+          <p:nvPr/>
+        </p:nvPicPr>
+        <p:blipFill>
+          <a:blip r:embed="rId3"/>
+          <a:stretch>
+            <a:fillRect/>
+          </a:stretch>
+        </p:blipFill>
+        <p:spPr>
+          <a:xfrm>
+            <a:off x="103271" y="668102"/>
+            <a:ext cx="6572250" cy="4276725"/>
+          </a:xfrm>
+          <a:prstGeom prst="rect">
+            <a:avLst/>
+          </a:prstGeom>
+        </p:spPr>
+      </p:pic>
+    </p:spTree>
+    <p:extLst>
+      <p:ext uri="{BB962C8B-B14F-4D97-AF65-F5344CB8AC3E}">
+        <p14:creationId xmlns:p14="http://schemas.microsoft.com/office/powerpoint/2010/main" val="3052855121"/>
+      </p:ext>
+    </p:extLst>
+  </p:cSld>
+  <p:clrMapOvr>
+    <a:masterClrMapping/>
+  </p:clrMapOvr>
+</p:sld>
+</file>
+
+<file path=ppt/slides/slide33.xml><?xml version="1.0" encoding="utf-8"?>
+<p:sld xmlns:a="http://schemas.openxmlformats.org/drawingml/2006/main" xmlns:r="http://schemas.openxmlformats.org/officeDocument/2006/relationships" xmlns:p="http://schemas.openxmlformats.org/presentationml/2006/main">
+  <p:cSld>
+    <p:spTree>
+      <p:nvGrpSpPr>
+        <p:cNvPr id="1" name=""/>
+        <p:cNvGrpSpPr/>
+        <p:nvPr/>
+      </p:nvGrpSpPr>
+      <p:grpSpPr>
+        <a:xfrm>
+          <a:off x="0" y="0"/>
+          <a:ext cx="0" cy="0"/>
+          <a:chOff x="0" y="0"/>
+          <a:chExt cx="0" cy="0"/>
+        </a:xfrm>
+      </p:grpSpPr>
+      <p:sp>
+        <p:nvSpPr>
+          <p:cNvPr id="2" name="Title 1">
+            <a:extLst>
+              <a:ext uri="{FF2B5EF4-FFF2-40B4-BE49-F238E27FC236}">
+                <a16:creationId xmlns:a16="http://schemas.microsoft.com/office/drawing/2014/main" id="{E100C4C4-ECC7-18BE-A34A-75F9B1031E02}"/>
+              </a:ext>
+            </a:extLst>
+          </p:cNvPr>
+          <p:cNvSpPr>
+            <a:spLocks noGrp="1"/>
+          </p:cNvSpPr>
+          <p:nvPr>
+            <p:ph type="title"/>
+          </p:nvPr>
+        </p:nvSpPr>
+        <p:spPr>
+          <a:xfrm>
+            <a:off x="311700" y="95402"/>
+            <a:ext cx="8520600" cy="572700"/>
+          </a:xfrm>
+        </p:spPr>
+        <p:txBody>
+          <a:bodyPr>
+            <a:normAutofit fontScale="90000"/>
+          </a:bodyPr>
+          <a:lstStyle/>
+          <a:p>
+            <a:r>
+              <a:rPr lang="en-GB" dirty="0"/>
+              <a:t>OOp101-1C2 – refactored </a:t>
+            </a:r>
+            <a:r>
+              <a:rPr lang="en-GB" dirty="0" err="1"/>
+              <a:t>handleKeyMovement</a:t>
+            </a:r>
+            <a:r>
+              <a:rPr lang="en-GB" dirty="0"/>
+              <a:t>()</a:t>
+            </a:r>
+          </a:p>
+        </p:txBody>
+      </p:sp>
+      <p:pic>
+        <p:nvPicPr>
+          <p:cNvPr id="5" name="Picture 4">
+            <a:extLst>
+              <a:ext uri="{FF2B5EF4-FFF2-40B4-BE49-F238E27FC236}">
+                <a16:creationId xmlns:a16="http://schemas.microsoft.com/office/drawing/2014/main" id="{88D273F8-AA76-F111-3A77-7D0D0E8BBFD9}"/>
+              </a:ext>
+            </a:extLst>
+          </p:cNvPr>
+          <p:cNvPicPr>
+            <a:picLocks noChangeAspect="1"/>
+          </p:cNvPicPr>
+          <p:nvPr/>
+        </p:nvPicPr>
+        <p:blipFill>
+          <a:blip r:embed="rId2"/>
+          <a:stretch>
+            <a:fillRect/>
+          </a:stretch>
+        </p:blipFill>
+        <p:spPr>
+          <a:xfrm>
+            <a:off x="6990076" y="1570175"/>
+            <a:ext cx="2153924" cy="3315820"/>
+          </a:xfrm>
+          <a:prstGeom prst="rect">
+            <a:avLst/>
+          </a:prstGeom>
+        </p:spPr>
+      </p:pic>
+      <p:pic>
+        <p:nvPicPr>
+          <p:cNvPr id="4" name="Picture 3">
+            <a:extLst>
+              <a:ext uri="{FF2B5EF4-FFF2-40B4-BE49-F238E27FC236}">
+                <a16:creationId xmlns:a16="http://schemas.microsoft.com/office/drawing/2014/main" id="{46FBFD94-A5A7-B695-45AF-1E5741C365CD}"/>
+              </a:ext>
+            </a:extLst>
+          </p:cNvPr>
+          <p:cNvPicPr>
+            <a:picLocks noChangeAspect="1"/>
+          </p:cNvPicPr>
+          <p:nvPr/>
+        </p:nvPicPr>
+        <p:blipFill>
+          <a:blip r:embed="rId3"/>
+          <a:stretch>
+            <a:fillRect/>
+          </a:stretch>
+        </p:blipFill>
+        <p:spPr>
+          <a:xfrm>
+            <a:off x="311700" y="861172"/>
+            <a:ext cx="5219700" cy="3905250"/>
+          </a:xfrm>
+          <a:prstGeom prst="rect">
+            <a:avLst/>
+          </a:prstGeom>
+        </p:spPr>
+      </p:pic>
+      <p:sp>
+        <p:nvSpPr>
+          <p:cNvPr id="7" name="TextBox 6">
+            <a:extLst>
+              <a:ext uri="{FF2B5EF4-FFF2-40B4-BE49-F238E27FC236}">
+                <a16:creationId xmlns:a16="http://schemas.microsoft.com/office/drawing/2014/main" id="{F36E58A7-4265-75FD-FA91-19E1F46D60BD}"/>
+              </a:ext>
+            </a:extLst>
+          </p:cNvPr>
+          <p:cNvSpPr txBox="1"/>
+          <p:nvPr/>
+        </p:nvSpPr>
+        <p:spPr>
+          <a:xfrm>
+            <a:off x="5674659" y="526908"/>
+            <a:ext cx="2834430" cy="954107"/>
+          </a:xfrm>
+          <a:prstGeom prst="rect">
+            <a:avLst/>
+          </a:prstGeom>
+          <a:noFill/>
+        </p:spPr>
+        <p:txBody>
+          <a:bodyPr wrap="none" rtlCol="0">
+            <a:spAutoFit/>
+          </a:bodyPr>
+          <a:lstStyle/>
+          <a:p>
+            <a:r>
+              <a:rPr lang="en-GB" dirty="0"/>
+              <a:t>This is CONCEPT code so when </a:t>
+            </a:r>
+          </a:p>
+          <a:p>
+            <a:r>
+              <a:rPr lang="en-GB" dirty="0"/>
+              <a:t>  implementing a Player Object </a:t>
+            </a:r>
+          </a:p>
+          <a:p>
+            <a:r>
+              <a:rPr lang="en-GB" dirty="0"/>
+              <a:t>  as a descendant of </a:t>
+            </a:r>
+            <a:r>
+              <a:rPr lang="en-GB" dirty="0" err="1"/>
+              <a:t>GfxObject</a:t>
+            </a:r>
+            <a:endParaRPr lang="en-GB" dirty="0"/>
+          </a:p>
+          <a:p>
+            <a:r>
+              <a:rPr lang="en-GB" dirty="0"/>
+              <a:t>  how to do this is easier…</a:t>
+            </a:r>
+          </a:p>
+        </p:txBody>
+      </p:sp>
+    </p:spTree>
+    <p:extLst>
+      <p:ext uri="{BB962C8B-B14F-4D97-AF65-F5344CB8AC3E}">
+        <p14:creationId xmlns:p14="http://schemas.microsoft.com/office/powerpoint/2010/main" val="462094726"/>
+      </p:ext>
+    </p:extLst>
+  </p:cSld>
+  <p:clrMapOvr>
+    <a:masterClrMapping/>
+  </p:clrMapOvr>
+</p:sld>
+</file>
+
+<file path=ppt/slides/slide34.xml><?xml version="1.0" encoding="utf-8"?>
+<p:sld xmlns:a="http://schemas.openxmlformats.org/drawingml/2006/main" xmlns:r="http://schemas.openxmlformats.org/officeDocument/2006/relationships" xmlns:p="http://schemas.openxmlformats.org/presentationml/2006/main">
+  <p:cSld>
+    <p:spTree>
+      <p:nvGrpSpPr>
+        <p:cNvPr id="1" name=""/>
+        <p:cNvGrpSpPr/>
+        <p:nvPr/>
+      </p:nvGrpSpPr>
+      <p:grpSpPr>
+        <a:xfrm>
+          <a:off x="0" y="0"/>
+          <a:ext cx="0" cy="0"/>
+          <a:chOff x="0" y="0"/>
+          <a:chExt cx="0" cy="0"/>
+        </a:xfrm>
+      </p:grpSpPr>
+      <p:sp>
+        <p:nvSpPr>
+          <p:cNvPr id="2" name="Title 1">
+            <a:extLst>
+              <a:ext uri="{FF2B5EF4-FFF2-40B4-BE49-F238E27FC236}">
+                <a16:creationId xmlns:a16="http://schemas.microsoft.com/office/drawing/2014/main" id="{33464FEF-E82E-18D2-8739-91593A895F81}"/>
+              </a:ext>
+            </a:extLst>
+          </p:cNvPr>
+          <p:cNvSpPr>
+            <a:spLocks noGrp="1"/>
+          </p:cNvSpPr>
+          <p:nvPr>
+            <p:ph type="title"/>
+          </p:nvPr>
+        </p:nvSpPr>
+        <p:spPr/>
+        <p:txBody>
+          <a:bodyPr>
+            <a:normAutofit fontScale="90000"/>
+          </a:bodyPr>
+          <a:lstStyle/>
+          <a:p>
+            <a:r>
+              <a:rPr lang="en-GB" dirty="0"/>
+              <a:t>Adding </a:t>
+            </a:r>
+            <a:r>
+              <a:rPr lang="en-GB" dirty="0" err="1"/>
+              <a:t>keybinds</a:t>
+            </a:r>
+            <a:r>
+              <a:rPr lang="en-GB" dirty="0"/>
+              <a:t> in main()</a:t>
+            </a:r>
+          </a:p>
+        </p:txBody>
+      </p:sp>
+      <p:pic>
+        <p:nvPicPr>
+          <p:cNvPr id="5" name="Picture 4">
+            <a:extLst>
+              <a:ext uri="{FF2B5EF4-FFF2-40B4-BE49-F238E27FC236}">
+                <a16:creationId xmlns:a16="http://schemas.microsoft.com/office/drawing/2014/main" id="{D2929301-7DB7-73DC-290E-8369B0237C10}"/>
+              </a:ext>
+            </a:extLst>
+          </p:cNvPr>
+          <p:cNvPicPr>
+            <a:picLocks noChangeAspect="1"/>
+          </p:cNvPicPr>
+          <p:nvPr/>
+        </p:nvPicPr>
+        <p:blipFill>
+          <a:blip r:embed="rId2"/>
+          <a:stretch>
+            <a:fillRect/>
+          </a:stretch>
+        </p:blipFill>
+        <p:spPr>
+          <a:xfrm>
+            <a:off x="311700" y="1105707"/>
+            <a:ext cx="5368458" cy="3757086"/>
+          </a:xfrm>
+          <a:prstGeom prst="rect">
+            <a:avLst/>
+          </a:prstGeom>
+        </p:spPr>
+      </p:pic>
+      <p:sp>
+        <p:nvSpPr>
+          <p:cNvPr id="6" name="TextBox 5">
+            <a:extLst>
+              <a:ext uri="{FF2B5EF4-FFF2-40B4-BE49-F238E27FC236}">
+                <a16:creationId xmlns:a16="http://schemas.microsoft.com/office/drawing/2014/main" id="{F37D1A6A-F52B-B1E6-AA93-E9632C62B330}"/>
+              </a:ext>
+            </a:extLst>
+          </p:cNvPr>
+          <p:cNvSpPr txBox="1"/>
+          <p:nvPr/>
+        </p:nvSpPr>
+        <p:spPr>
+          <a:xfrm>
+            <a:off x="5842748" y="1017725"/>
+            <a:ext cx="3230372" cy="1169551"/>
+          </a:xfrm>
+          <a:prstGeom prst="rect">
+            <a:avLst/>
+          </a:prstGeom>
+          <a:noFill/>
+        </p:spPr>
+        <p:txBody>
+          <a:bodyPr wrap="none" rtlCol="0">
+            <a:spAutoFit/>
+          </a:bodyPr>
+          <a:lstStyle/>
+          <a:p>
+            <a:r>
+              <a:rPr lang="en-GB" dirty="0"/>
+              <a:t>Note its now possible to have multiple </a:t>
+            </a:r>
+          </a:p>
+          <a:p>
+            <a:r>
+              <a:rPr lang="en-GB" dirty="0"/>
+              <a:t>key-binds onto one action</a:t>
+            </a:r>
+          </a:p>
+          <a:p>
+            <a:endParaRPr lang="en-GB" dirty="0"/>
+          </a:p>
+          <a:p>
+            <a:r>
+              <a:rPr lang="en-GB" dirty="0"/>
+              <a:t>In this case we have </a:t>
+            </a:r>
+          </a:p>
+          <a:p>
+            <a:r>
+              <a:rPr lang="en-GB" dirty="0"/>
+              <a:t>“left” bound to both “a” and “left arrow”</a:t>
+            </a:r>
+          </a:p>
+        </p:txBody>
+      </p:sp>
+    </p:spTree>
+    <p:extLst>
+      <p:ext uri="{BB962C8B-B14F-4D97-AF65-F5344CB8AC3E}">
+        <p14:creationId xmlns:p14="http://schemas.microsoft.com/office/powerpoint/2010/main" val="3211014490"/>
+      </p:ext>
+    </p:extLst>
+  </p:cSld>
+  <p:clrMapOvr>
+    <a:masterClrMapping/>
+  </p:clrMapOvr>
+</p:sld>
+</file>
+
+<file path=ppt/slides/slide35.xml><?xml version="1.0" encoding="utf-8"?>
+<p:sld xmlns:a="http://schemas.openxmlformats.org/drawingml/2006/main" xmlns:r="http://schemas.openxmlformats.org/officeDocument/2006/relationships" xmlns:p="http://schemas.openxmlformats.org/presentationml/2006/main">
+  <p:cSld>
+    <p:spTree>
+      <p:nvGrpSpPr>
+        <p:cNvPr id="1" name=""/>
+        <p:cNvGrpSpPr/>
+        <p:nvPr/>
+      </p:nvGrpSpPr>
+      <p:grpSpPr>
+        <a:xfrm>
+          <a:off x="0" y="0"/>
+          <a:ext cx="0" cy="0"/>
+          <a:chOff x="0" y="0"/>
+          <a:chExt cx="0" cy="0"/>
+        </a:xfrm>
+      </p:grpSpPr>
+      <p:sp>
+        <p:nvSpPr>
+          <p:cNvPr id="2" name="Title 1">
+            <a:extLst>
+              <a:ext uri="{FF2B5EF4-FFF2-40B4-BE49-F238E27FC236}">
+                <a16:creationId xmlns:a16="http://schemas.microsoft.com/office/drawing/2014/main" id="{E100C4C4-ECC7-18BE-A34A-75F9B1031E02}"/>
+              </a:ext>
+            </a:extLst>
+          </p:cNvPr>
+          <p:cNvSpPr>
+            <a:spLocks noGrp="1"/>
+          </p:cNvSpPr>
+          <p:nvPr>
+            <p:ph type="title"/>
+          </p:nvPr>
+        </p:nvSpPr>
+        <p:spPr>
+          <a:xfrm>
+            <a:off x="311700" y="95402"/>
+            <a:ext cx="8520600" cy="572700"/>
+          </a:xfrm>
+        </p:spPr>
+        <p:txBody>
+          <a:bodyPr>
+            <a:normAutofit fontScale="90000"/>
+          </a:bodyPr>
+          <a:lstStyle/>
+          <a:p>
+            <a:r>
+              <a:rPr lang="en-GB" dirty="0"/>
+              <a:t>OOp101-1C2 – main function refactored </a:t>
+            </a:r>
+            <a:r>
+              <a:rPr lang="en-GB" dirty="0" err="1"/>
+              <a:t>drawRedFigure</a:t>
+            </a:r>
+            <a:endParaRPr lang="en-GB" dirty="0"/>
+          </a:p>
+        </p:txBody>
+      </p:sp>
+      <p:pic>
+        <p:nvPicPr>
+          <p:cNvPr id="5" name="Picture 4">
+            <a:extLst>
+              <a:ext uri="{FF2B5EF4-FFF2-40B4-BE49-F238E27FC236}">
+                <a16:creationId xmlns:a16="http://schemas.microsoft.com/office/drawing/2014/main" id="{88D273F8-AA76-F111-3A77-7D0D0E8BBFD9}"/>
+              </a:ext>
+            </a:extLst>
+          </p:cNvPr>
+          <p:cNvPicPr>
+            <a:picLocks noChangeAspect="1"/>
+          </p:cNvPicPr>
+          <p:nvPr/>
+        </p:nvPicPr>
+        <p:blipFill>
+          <a:blip r:embed="rId2"/>
+          <a:stretch>
+            <a:fillRect/>
+          </a:stretch>
+        </p:blipFill>
+        <p:spPr>
+          <a:xfrm>
+            <a:off x="6990076" y="1570175"/>
+            <a:ext cx="2153924" cy="3315820"/>
+          </a:xfrm>
+          <a:prstGeom prst="rect">
+            <a:avLst/>
+          </a:prstGeom>
+        </p:spPr>
+      </p:pic>
+      <p:sp>
+        <p:nvSpPr>
+          <p:cNvPr id="7" name="TextBox 6">
+            <a:extLst>
+              <a:ext uri="{FF2B5EF4-FFF2-40B4-BE49-F238E27FC236}">
+                <a16:creationId xmlns:a16="http://schemas.microsoft.com/office/drawing/2014/main" id="{F36E58A7-4265-75FD-FA91-19E1F46D60BD}"/>
+              </a:ext>
+            </a:extLst>
+          </p:cNvPr>
+          <p:cNvSpPr txBox="1"/>
+          <p:nvPr/>
+        </p:nvSpPr>
+        <p:spPr>
+          <a:xfrm>
+            <a:off x="605118" y="3151178"/>
+            <a:ext cx="3735318" cy="307777"/>
+          </a:xfrm>
+          <a:prstGeom prst="rect">
+            <a:avLst/>
+          </a:prstGeom>
+          <a:noFill/>
+        </p:spPr>
+        <p:txBody>
+          <a:bodyPr wrap="none" rtlCol="0">
+            <a:spAutoFit/>
+          </a:bodyPr>
+          <a:lstStyle/>
+          <a:p>
+            <a:r>
+              <a:rPr lang="en-GB" dirty="0"/>
+              <a:t>Changed rectangle to look more like a player</a:t>
+            </a:r>
+          </a:p>
+        </p:txBody>
+      </p:sp>
+      <p:pic>
+        <p:nvPicPr>
+          <p:cNvPr id="6" name="Picture 5">
+            <a:extLst>
+              <a:ext uri="{FF2B5EF4-FFF2-40B4-BE49-F238E27FC236}">
+                <a16:creationId xmlns:a16="http://schemas.microsoft.com/office/drawing/2014/main" id="{3F9C0C1E-FBFB-EF3C-2642-10EBC79B8784}"/>
+              </a:ext>
+            </a:extLst>
+          </p:cNvPr>
+          <p:cNvPicPr>
+            <a:picLocks noChangeAspect="1"/>
+          </p:cNvPicPr>
+          <p:nvPr/>
+        </p:nvPicPr>
+        <p:blipFill>
+          <a:blip r:embed="rId3"/>
+          <a:stretch>
+            <a:fillRect/>
+          </a:stretch>
+        </p:blipFill>
+        <p:spPr>
+          <a:xfrm>
+            <a:off x="512109" y="1390089"/>
+            <a:ext cx="5162550" cy="1543050"/>
+          </a:xfrm>
+          <a:prstGeom prst="rect">
+            <a:avLst/>
+          </a:prstGeom>
+        </p:spPr>
+      </p:pic>
+      <p:pic>
+        <p:nvPicPr>
+          <p:cNvPr id="9" name="Picture 8">
+            <a:extLst>
+              <a:ext uri="{FF2B5EF4-FFF2-40B4-BE49-F238E27FC236}">
+                <a16:creationId xmlns:a16="http://schemas.microsoft.com/office/drawing/2014/main" id="{A6DDAEDF-63F0-C500-5E58-CA1AC336DBE4}"/>
+              </a:ext>
+            </a:extLst>
+          </p:cNvPr>
+          <p:cNvPicPr>
+            <a:picLocks noChangeAspect="1"/>
+          </p:cNvPicPr>
+          <p:nvPr/>
+        </p:nvPicPr>
+        <p:blipFill>
+          <a:blip r:embed="rId4"/>
+          <a:stretch>
+            <a:fillRect/>
+          </a:stretch>
+        </p:blipFill>
+        <p:spPr>
+          <a:xfrm>
+            <a:off x="4803566" y="3073192"/>
+            <a:ext cx="742950" cy="771525"/>
+          </a:xfrm>
+          <a:prstGeom prst="rect">
+            <a:avLst/>
+          </a:prstGeom>
+        </p:spPr>
+      </p:pic>
+    </p:spTree>
+    <p:extLst>
+      <p:ext uri="{BB962C8B-B14F-4D97-AF65-F5344CB8AC3E}">
+        <p14:creationId xmlns:p14="http://schemas.microsoft.com/office/powerpoint/2010/main" val="1708881174"/>
+      </p:ext>
+    </p:extLst>
+  </p:cSld>
+  <p:clrMapOvr>
+    <a:masterClrMapping/>
+  </p:clrMapOvr>
+</p:sld>
+</file>
+
+<file path=ppt/slides/slide36.xml><?xml version="1.0" encoding="utf-8"?>
+<p:sld xmlns:a="http://schemas.openxmlformats.org/drawingml/2006/main" xmlns:r="http://schemas.openxmlformats.org/officeDocument/2006/relationships" xmlns:p="http://schemas.openxmlformats.org/presentationml/2006/main">
+  <p:cSld>
+    <p:spTree>
+      <p:nvGrpSpPr>
+        <p:cNvPr id="1" name=""/>
+        <p:cNvGrpSpPr/>
+        <p:nvPr/>
+      </p:nvGrpSpPr>
+      <p:grpSpPr>
+        <a:xfrm>
+          <a:off x="0" y="0"/>
+          <a:ext cx="0" cy="0"/>
+          <a:chOff x="0" y="0"/>
+          <a:chExt cx="0" cy="0"/>
+        </a:xfrm>
+      </p:grpSpPr>
+      <p:sp>
+        <p:nvSpPr>
+          <p:cNvPr id="2" name="Title 1">
+            <a:extLst>
+              <a:ext uri="{FF2B5EF4-FFF2-40B4-BE49-F238E27FC236}">
+                <a16:creationId xmlns:a16="http://schemas.microsoft.com/office/drawing/2014/main" id="{E100C4C4-ECC7-18BE-A34A-75F9B1031E02}"/>
+              </a:ext>
+            </a:extLst>
+          </p:cNvPr>
+          <p:cNvSpPr>
+            <a:spLocks noGrp="1"/>
+          </p:cNvSpPr>
+          <p:nvPr>
+            <p:ph type="title"/>
+          </p:nvPr>
+        </p:nvSpPr>
+        <p:spPr>
+          <a:xfrm>
+            <a:off x="311700" y="95402"/>
+            <a:ext cx="8520600" cy="572700"/>
+          </a:xfrm>
+        </p:spPr>
+        <p:txBody>
+          <a:bodyPr>
+            <a:normAutofit fontScale="90000"/>
+          </a:bodyPr>
+          <a:lstStyle/>
+          <a:p>
+            <a:r>
+              <a:rPr lang="en-GB" dirty="0"/>
+              <a:t>OOp101-1C2 – developmental Testing of </a:t>
+            </a:r>
+            <a:r>
+              <a:rPr lang="en-GB" dirty="0" err="1"/>
+              <a:t>redFigure</a:t>
+            </a:r>
+            <a:endParaRPr lang="en-GB" dirty="0"/>
+          </a:p>
+        </p:txBody>
+      </p:sp>
+      <p:sp>
+        <p:nvSpPr>
+          <p:cNvPr id="3" name="TextBox 2">
+            <a:extLst>
+              <a:ext uri="{FF2B5EF4-FFF2-40B4-BE49-F238E27FC236}">
+                <a16:creationId xmlns:a16="http://schemas.microsoft.com/office/drawing/2014/main" id="{A280B686-544B-DB5E-1714-E8D7C6346B28}"/>
+              </a:ext>
+            </a:extLst>
+          </p:cNvPr>
+          <p:cNvSpPr txBox="1"/>
+          <p:nvPr/>
+        </p:nvSpPr>
+        <p:spPr>
+          <a:xfrm>
+            <a:off x="430306" y="3817999"/>
+            <a:ext cx="1000595" cy="307777"/>
+          </a:xfrm>
+          <a:prstGeom prst="rect">
+            <a:avLst/>
+          </a:prstGeom>
+          <a:noFill/>
+        </p:spPr>
+        <p:txBody>
+          <a:bodyPr wrap="none" rtlCol="0">
+            <a:spAutoFit/>
+          </a:bodyPr>
+          <a:lstStyle/>
+          <a:p>
+            <a:r>
+              <a:rPr lang="en-GB" dirty="0"/>
+              <a:t>On launch</a:t>
+            </a:r>
+          </a:p>
+        </p:txBody>
+      </p:sp>
+      <p:sp>
+        <p:nvSpPr>
+          <p:cNvPr id="4" name="TextBox 3">
+            <a:extLst>
+              <a:ext uri="{FF2B5EF4-FFF2-40B4-BE49-F238E27FC236}">
+                <a16:creationId xmlns:a16="http://schemas.microsoft.com/office/drawing/2014/main" id="{F381A76B-40D9-FC3B-6522-7751A35B85D6}"/>
+              </a:ext>
+            </a:extLst>
+          </p:cNvPr>
+          <p:cNvSpPr txBox="1"/>
+          <p:nvPr/>
+        </p:nvSpPr>
+        <p:spPr>
+          <a:xfrm>
+            <a:off x="3124201" y="3817999"/>
+            <a:ext cx="2661306" cy="307777"/>
+          </a:xfrm>
+          <a:prstGeom prst="rect">
+            <a:avLst/>
+          </a:prstGeom>
+          <a:noFill/>
+        </p:spPr>
+        <p:txBody>
+          <a:bodyPr wrap="none" rtlCol="0">
+            <a:spAutoFit/>
+          </a:bodyPr>
+          <a:lstStyle/>
+          <a:p>
+            <a:r>
+              <a:rPr lang="en-GB" dirty="0"/>
+              <a:t>After pressing “d” several times</a:t>
+            </a:r>
+          </a:p>
+        </p:txBody>
+      </p:sp>
+      <p:sp>
+        <p:nvSpPr>
+          <p:cNvPr id="8" name="TextBox 7">
+            <a:extLst>
+              <a:ext uri="{FF2B5EF4-FFF2-40B4-BE49-F238E27FC236}">
+                <a16:creationId xmlns:a16="http://schemas.microsoft.com/office/drawing/2014/main" id="{20CB8462-0AA4-C0ED-0426-FCC0757FC5A8}"/>
+              </a:ext>
+            </a:extLst>
+          </p:cNvPr>
+          <p:cNvSpPr txBox="1"/>
+          <p:nvPr/>
+        </p:nvSpPr>
+        <p:spPr>
+          <a:xfrm>
+            <a:off x="5986184" y="3817999"/>
+            <a:ext cx="2674130" cy="523220"/>
+          </a:xfrm>
+          <a:prstGeom prst="rect">
+            <a:avLst/>
+          </a:prstGeom>
+          <a:noFill/>
+        </p:spPr>
+        <p:txBody>
+          <a:bodyPr wrap="none" rtlCol="0">
+            <a:spAutoFit/>
+          </a:bodyPr>
+          <a:lstStyle/>
+          <a:p>
+            <a:r>
+              <a:rPr lang="en-GB" dirty="0"/>
+              <a:t>After pressing “a” or “left arrow”</a:t>
+            </a:r>
+          </a:p>
+          <a:p>
+            <a:r>
+              <a:rPr lang="en-GB" dirty="0"/>
+              <a:t>several times</a:t>
+            </a:r>
+          </a:p>
+        </p:txBody>
+      </p:sp>
+      <p:pic>
+        <p:nvPicPr>
+          <p:cNvPr id="11" name="Picture 10">
+            <a:extLst>
+              <a:ext uri="{FF2B5EF4-FFF2-40B4-BE49-F238E27FC236}">
+                <a16:creationId xmlns:a16="http://schemas.microsoft.com/office/drawing/2014/main" id="{82D08D96-E6B6-A889-B5CA-56455F348C99}"/>
+              </a:ext>
+            </a:extLst>
+          </p:cNvPr>
+          <p:cNvPicPr>
+            <a:picLocks noChangeAspect="1"/>
+          </p:cNvPicPr>
+          <p:nvPr/>
+        </p:nvPicPr>
+        <p:blipFill>
+          <a:blip r:embed="rId2"/>
+          <a:stretch>
+            <a:fillRect/>
+          </a:stretch>
+        </p:blipFill>
+        <p:spPr>
+          <a:xfrm>
+            <a:off x="130380" y="1383315"/>
+            <a:ext cx="2665501" cy="2107142"/>
+          </a:xfrm>
+          <a:prstGeom prst="rect">
+            <a:avLst/>
+          </a:prstGeom>
+        </p:spPr>
+      </p:pic>
+      <p:pic>
+        <p:nvPicPr>
+          <p:cNvPr id="13" name="Picture 12">
+            <a:extLst>
+              <a:ext uri="{FF2B5EF4-FFF2-40B4-BE49-F238E27FC236}">
+                <a16:creationId xmlns:a16="http://schemas.microsoft.com/office/drawing/2014/main" id="{5EC54AA9-BCD1-C134-0A99-B247DCEDB1DA}"/>
+              </a:ext>
+            </a:extLst>
+          </p:cNvPr>
+          <p:cNvPicPr>
+            <a:picLocks noChangeAspect="1"/>
+          </p:cNvPicPr>
+          <p:nvPr/>
+        </p:nvPicPr>
+        <p:blipFill>
+          <a:blip r:embed="rId3"/>
+          <a:stretch>
+            <a:fillRect/>
+          </a:stretch>
+        </p:blipFill>
+        <p:spPr>
+          <a:xfrm>
+            <a:off x="3025588" y="1383314"/>
+            <a:ext cx="2661305" cy="2107143"/>
+          </a:xfrm>
+          <a:prstGeom prst="rect">
+            <a:avLst/>
+          </a:prstGeom>
+        </p:spPr>
+      </p:pic>
+      <p:pic>
+        <p:nvPicPr>
+          <p:cNvPr id="15" name="Picture 14">
+            <a:extLst>
+              <a:ext uri="{FF2B5EF4-FFF2-40B4-BE49-F238E27FC236}">
+                <a16:creationId xmlns:a16="http://schemas.microsoft.com/office/drawing/2014/main" id="{5D737D3E-73ED-C38F-C82E-EA7FFB8B07B3}"/>
+              </a:ext>
+            </a:extLst>
+          </p:cNvPr>
+          <p:cNvPicPr>
+            <a:picLocks noChangeAspect="1"/>
+          </p:cNvPicPr>
+          <p:nvPr/>
+        </p:nvPicPr>
+        <p:blipFill>
+          <a:blip r:embed="rId4"/>
+          <a:stretch>
+            <a:fillRect/>
+          </a:stretch>
+        </p:blipFill>
+        <p:spPr>
+          <a:xfrm>
+            <a:off x="5986184" y="1383314"/>
+            <a:ext cx="2661306" cy="2112411"/>
+          </a:xfrm>
+          <a:prstGeom prst="rect">
+            <a:avLst/>
+          </a:prstGeom>
+        </p:spPr>
+      </p:pic>
+    </p:spTree>
+    <p:extLst>
+      <p:ext uri="{BB962C8B-B14F-4D97-AF65-F5344CB8AC3E}">
+        <p14:creationId xmlns:p14="http://schemas.microsoft.com/office/powerpoint/2010/main" val="1996103019"/>
+      </p:ext>
+    </p:extLst>
   </p:cSld>
   <p:clrMapOvr>
     <a:masterClrMapping/>

</xml_diff>